<commit_message>
updated COL and MRP resources diagrams to reposition and a few edits and for better resolution; also renamed those image files. updated mrp and col mark up file, minor formatting edit to gic page. minor edit to vte1.md to remove a strange symbol
</commit_message>
<xml_diff>
--- a/input/images/source/DEQM Resource Diagram - MRP.pptx
+++ b/input/images/source/DEQM Resource Diagram - MRP.pptx
@@ -9,6 +9,8 @@
     <p:sldId id="258" r:id="rId3"/>
     <p:sldId id="257" r:id="rId4"/>
     <p:sldId id="259" r:id="rId5"/>
+    <p:sldId id="260" r:id="rId6"/>
+    <p:sldId id="261" r:id="rId7"/>
   </p:sldIdLst>
   <p:sldSz cx="9144000" cy="6858000" type="screen4x3"/>
   <p:notesSz cx="6858000" cy="9144000"/>
@@ -3218,6 +3220,9 @@
               <a:t>Slide 4 -  Figure 2.2 - mrp-observation.jpg</a:t>
             </a:r>
           </a:p>
+          <a:p>
+            <a:endParaRPr lang="en-US" dirty="0"/>
+          </a:p>
         </p:txBody>
       </p:sp>
     </p:spTree>
@@ -5819,6 +5824,3160 @@
     <p:extLst>
       <p:ext uri="{BB962C8B-B14F-4D97-AF65-F5344CB8AC3E}">
         <p14:creationId xmlns:p14="http://schemas.microsoft.com/office/powerpoint/2010/main" val="3821708505"/>
+      </p:ext>
+    </p:extLst>
+  </p:cSld>
+  <p:clrMapOvr>
+    <a:masterClrMapping/>
+  </p:clrMapOvr>
+</p:sld>
+</file>
+
+<file path=ppt/slides/slide5.xml><?xml version="1.0" encoding="utf-8"?>
+<p:sld xmlns:a="http://schemas.openxmlformats.org/drawingml/2006/main" xmlns:r="http://schemas.openxmlformats.org/officeDocument/2006/relationships" xmlns:p="http://schemas.openxmlformats.org/presentationml/2006/main">
+  <p:cSld>
+    <p:spTree>
+      <p:nvGrpSpPr>
+        <p:cNvPr id="1" name=""/>
+        <p:cNvGrpSpPr/>
+        <p:nvPr/>
+      </p:nvGrpSpPr>
+      <p:grpSpPr>
+        <a:xfrm>
+          <a:off x="0" y="0"/>
+          <a:ext cx="0" cy="0"/>
+          <a:chOff x="0" y="0"/>
+          <a:chExt cx="0" cy="0"/>
+        </a:xfrm>
+      </p:grpSpPr>
+      <p:cxnSp>
+        <p:nvCxnSpPr>
+          <p:cNvPr id="57" name="Straight Arrow Connector 56">
+            <a:extLst>
+              <a:ext uri="{FF2B5EF4-FFF2-40B4-BE49-F238E27FC236}">
+                <a16:creationId xmlns:a16="http://schemas.microsoft.com/office/drawing/2014/main" id="{8C3F4A99-F4CC-4173-AFF4-466DB7FC526E}"/>
+              </a:ext>
+            </a:extLst>
+          </p:cNvPr>
+          <p:cNvCxnSpPr>
+            <a:cxnSpLocks/>
+            <a:stCxn id="24" idx="1"/>
+            <a:endCxn id="15" idx="3"/>
+          </p:cNvCxnSpPr>
+          <p:nvPr/>
+        </p:nvCxnSpPr>
+        <p:spPr>
+          <a:xfrm flipH="1">
+            <a:off x="5324363" y="3408919"/>
+            <a:ext cx="1524689" cy="4713"/>
+          </a:xfrm>
+          <a:prstGeom prst="straightConnector1">
+            <a:avLst/>
+          </a:prstGeom>
+          <a:ln w="28575">
+            <a:solidFill>
+              <a:schemeClr val="tx1"/>
+            </a:solidFill>
+            <a:tailEnd type="triangle"/>
+          </a:ln>
+        </p:spPr>
+        <p:style>
+          <a:lnRef idx="1">
+            <a:schemeClr val="accent1"/>
+          </a:lnRef>
+          <a:fillRef idx="0">
+            <a:schemeClr val="accent1"/>
+          </a:fillRef>
+          <a:effectRef idx="0">
+            <a:schemeClr val="accent1"/>
+          </a:effectRef>
+          <a:fontRef idx="minor">
+            <a:schemeClr val="tx1"/>
+          </a:fontRef>
+        </p:style>
+      </p:cxnSp>
+      <p:sp>
+        <p:nvSpPr>
+          <p:cNvPr id="3" name="Content Placeholder 2"/>
+          <p:cNvSpPr>
+            <a:spLocks noGrp="1"/>
+          </p:cNvSpPr>
+          <p:nvPr>
+            <p:ph idx="1"/>
+          </p:nvPr>
+        </p:nvSpPr>
+        <p:spPr/>
+        <p:txBody>
+          <a:bodyPr/>
+          <a:lstStyle/>
+          <a:p>
+            <a:pPr marL="0" indent="0">
+              <a:buNone/>
+            </a:pPr>
+            <a:r>
+              <a:rPr lang="en-US" dirty="0"/>
+              <a:t>  </a:t>
+            </a:r>
+          </a:p>
+        </p:txBody>
+      </p:sp>
+      <p:sp>
+        <p:nvSpPr>
+          <p:cNvPr id="4" name="Flowchart: Alternate Process 3"/>
+          <p:cNvSpPr/>
+          <p:nvPr/>
+        </p:nvSpPr>
+        <p:spPr>
+          <a:xfrm>
+            <a:off x="1219200" y="1505477"/>
+            <a:ext cx="1524000" cy="609600"/>
+          </a:xfrm>
+          <a:prstGeom prst="flowChartAlternateProcess">
+            <a:avLst/>
+          </a:prstGeom>
+          <a:ln w="12700">
+            <a:solidFill>
+              <a:schemeClr val="tx2"/>
+            </a:solidFill>
+          </a:ln>
+        </p:spPr>
+        <p:style>
+          <a:lnRef idx="2">
+            <a:schemeClr val="accent1">
+              <a:shade val="50000"/>
+            </a:schemeClr>
+          </a:lnRef>
+          <a:fillRef idx="1">
+            <a:schemeClr val="accent1"/>
+          </a:fillRef>
+          <a:effectRef idx="0">
+            <a:schemeClr val="accent1"/>
+          </a:effectRef>
+          <a:fontRef idx="minor">
+            <a:schemeClr val="lt1"/>
+          </a:fontRef>
+        </p:style>
+        <p:txBody>
+          <a:bodyPr rtlCol="0" anchor="ctr"/>
+          <a:lstStyle/>
+          <a:p>
+            <a:pPr algn="ctr"/>
+            <a:r>
+              <a:rPr lang="en-US" sz="1400" dirty="0">
+                <a:solidFill>
+                  <a:schemeClr val="bg1"/>
+                </a:solidFill>
+              </a:rPr>
+              <a:t>Measure</a:t>
+            </a:r>
+          </a:p>
+        </p:txBody>
+      </p:sp>
+      <p:sp>
+        <p:nvSpPr>
+          <p:cNvPr id="6" name="Flowchart: Alternate Process 5"/>
+          <p:cNvSpPr/>
+          <p:nvPr/>
+        </p:nvSpPr>
+        <p:spPr>
+          <a:xfrm>
+            <a:off x="1219200" y="3132015"/>
+            <a:ext cx="1524000" cy="609600"/>
+          </a:xfrm>
+          <a:prstGeom prst="flowChartAlternateProcess">
+            <a:avLst/>
+          </a:prstGeom>
+          <a:ln w="12700">
+            <a:solidFill>
+              <a:schemeClr val="tx2"/>
+            </a:solidFill>
+          </a:ln>
+        </p:spPr>
+        <p:style>
+          <a:lnRef idx="2">
+            <a:schemeClr val="accent1">
+              <a:shade val="50000"/>
+            </a:schemeClr>
+          </a:lnRef>
+          <a:fillRef idx="1">
+            <a:schemeClr val="accent1"/>
+          </a:fillRef>
+          <a:effectRef idx="0">
+            <a:schemeClr val="accent1"/>
+          </a:effectRef>
+          <a:fontRef idx="minor">
+            <a:schemeClr val="lt1"/>
+          </a:fontRef>
+        </p:style>
+        <p:txBody>
+          <a:bodyPr rtlCol="0" anchor="ctr"/>
+          <a:lstStyle/>
+          <a:p>
+            <a:pPr algn="ctr"/>
+            <a:r>
+              <a:rPr lang="en-US" sz="1400" dirty="0">
+                <a:solidFill>
+                  <a:schemeClr val="bg1"/>
+                </a:solidFill>
+              </a:rPr>
+              <a:t>MeasureReport</a:t>
+            </a:r>
+          </a:p>
+        </p:txBody>
+      </p:sp>
+      <p:sp>
+        <p:nvSpPr>
+          <p:cNvPr id="10" name="Flowchart: Alternate Process 9"/>
+          <p:cNvSpPr/>
+          <p:nvPr/>
+        </p:nvSpPr>
+        <p:spPr>
+          <a:xfrm>
+            <a:off x="1219200" y="4758553"/>
+            <a:ext cx="1524000" cy="609600"/>
+          </a:xfrm>
+          <a:prstGeom prst="flowChartAlternateProcess">
+            <a:avLst/>
+          </a:prstGeom>
+          <a:ln w="12700">
+            <a:solidFill>
+              <a:schemeClr val="tx2"/>
+            </a:solidFill>
+          </a:ln>
+        </p:spPr>
+        <p:style>
+          <a:lnRef idx="2">
+            <a:schemeClr val="accent1">
+              <a:shade val="50000"/>
+            </a:schemeClr>
+          </a:lnRef>
+          <a:fillRef idx="1">
+            <a:schemeClr val="accent1"/>
+          </a:fillRef>
+          <a:effectRef idx="0">
+            <a:schemeClr val="accent1"/>
+          </a:effectRef>
+          <a:fontRef idx="minor">
+            <a:schemeClr val="lt1"/>
+          </a:fontRef>
+        </p:style>
+        <p:txBody>
+          <a:bodyPr rtlCol="0" anchor="ctr"/>
+          <a:lstStyle/>
+          <a:p>
+            <a:pPr algn="ctr"/>
+            <a:r>
+              <a:rPr lang="en-US" sz="1400" dirty="0">
+                <a:solidFill>
+                  <a:schemeClr val="bg1"/>
+                </a:solidFill>
+              </a:rPr>
+              <a:t>Task</a:t>
+            </a:r>
+          </a:p>
+        </p:txBody>
+      </p:sp>
+      <p:sp>
+        <p:nvSpPr>
+          <p:cNvPr id="11" name="Flowchart: Alternate Process 10"/>
+          <p:cNvSpPr/>
+          <p:nvPr/>
+        </p:nvSpPr>
+        <p:spPr>
+          <a:xfrm>
+            <a:off x="1513768" y="4870164"/>
+            <a:ext cx="1524000" cy="609600"/>
+          </a:xfrm>
+          <a:prstGeom prst="flowChartAlternateProcess">
+            <a:avLst/>
+          </a:prstGeom>
+          <a:ln w="12700">
+            <a:solidFill>
+              <a:schemeClr val="tx2"/>
+            </a:solidFill>
+          </a:ln>
+        </p:spPr>
+        <p:style>
+          <a:lnRef idx="2">
+            <a:schemeClr val="accent1">
+              <a:shade val="50000"/>
+            </a:schemeClr>
+          </a:lnRef>
+          <a:fillRef idx="1">
+            <a:schemeClr val="accent1"/>
+          </a:fillRef>
+          <a:effectRef idx="0">
+            <a:schemeClr val="accent1"/>
+          </a:effectRef>
+          <a:fontRef idx="minor">
+            <a:schemeClr val="lt1"/>
+          </a:fontRef>
+        </p:style>
+        <p:txBody>
+          <a:bodyPr rtlCol="0" anchor="ctr"/>
+          <a:lstStyle/>
+          <a:p>
+            <a:pPr algn="ctr"/>
+            <a:r>
+              <a:rPr lang="en-US" sz="1400" dirty="0">
+                <a:solidFill>
+                  <a:schemeClr val="bg1"/>
+                </a:solidFill>
+              </a:rPr>
+              <a:t>Task</a:t>
+            </a:r>
+          </a:p>
+        </p:txBody>
+      </p:sp>
+      <p:sp>
+        <p:nvSpPr>
+          <p:cNvPr id="12" name="Flowchart: Alternate Process 11"/>
+          <p:cNvSpPr/>
+          <p:nvPr/>
+        </p:nvSpPr>
+        <p:spPr>
+          <a:xfrm>
+            <a:off x="1823422" y="5014547"/>
+            <a:ext cx="1524000" cy="609600"/>
+          </a:xfrm>
+          <a:prstGeom prst="flowChartAlternateProcess">
+            <a:avLst/>
+          </a:prstGeom>
+          <a:ln w="12700">
+            <a:solidFill>
+              <a:schemeClr val="tx2"/>
+            </a:solidFill>
+          </a:ln>
+        </p:spPr>
+        <p:style>
+          <a:lnRef idx="2">
+            <a:schemeClr val="accent1">
+              <a:shade val="50000"/>
+            </a:schemeClr>
+          </a:lnRef>
+          <a:fillRef idx="1">
+            <a:schemeClr val="accent1"/>
+          </a:fillRef>
+          <a:effectRef idx="0">
+            <a:schemeClr val="accent1"/>
+          </a:effectRef>
+          <a:fontRef idx="minor">
+            <a:schemeClr val="lt1"/>
+          </a:fontRef>
+        </p:style>
+        <p:txBody>
+          <a:bodyPr rtlCol="0" anchor="ctr"/>
+          <a:lstStyle/>
+          <a:p>
+            <a:pPr algn="ctr"/>
+            <a:r>
+              <a:rPr lang="en-US" sz="1400" dirty="0">
+                <a:solidFill>
+                  <a:schemeClr val="bg1"/>
+                </a:solidFill>
+              </a:rPr>
+              <a:t>Task</a:t>
+            </a:r>
+          </a:p>
+        </p:txBody>
+      </p:sp>
+      <p:sp>
+        <p:nvSpPr>
+          <p:cNvPr id="14" name="Flowchart: Alternate Process 13"/>
+          <p:cNvSpPr/>
+          <p:nvPr/>
+        </p:nvSpPr>
+        <p:spPr>
+          <a:xfrm>
+            <a:off x="3784915" y="1850896"/>
+            <a:ext cx="1524000" cy="609600"/>
+          </a:xfrm>
+          <a:prstGeom prst="flowChartAlternateProcess">
+            <a:avLst/>
+          </a:prstGeom>
+          <a:ln w="12700">
+            <a:solidFill>
+              <a:schemeClr val="tx2"/>
+            </a:solidFill>
+          </a:ln>
+        </p:spPr>
+        <p:style>
+          <a:lnRef idx="2">
+            <a:schemeClr val="accent1">
+              <a:shade val="50000"/>
+            </a:schemeClr>
+          </a:lnRef>
+          <a:fillRef idx="1">
+            <a:schemeClr val="accent1"/>
+          </a:fillRef>
+          <a:effectRef idx="0">
+            <a:schemeClr val="accent1"/>
+          </a:effectRef>
+          <a:fontRef idx="minor">
+            <a:schemeClr val="lt1"/>
+          </a:fontRef>
+        </p:style>
+        <p:txBody>
+          <a:bodyPr rtlCol="0" anchor="ctr"/>
+          <a:lstStyle/>
+          <a:p>
+            <a:pPr algn="ctr"/>
+            <a:r>
+              <a:rPr lang="en-US" sz="1400" dirty="0">
+                <a:solidFill>
+                  <a:schemeClr val="bg1"/>
+                </a:solidFill>
+              </a:rPr>
+              <a:t>Organization</a:t>
+            </a:r>
+          </a:p>
+        </p:txBody>
+      </p:sp>
+      <p:sp>
+        <p:nvSpPr>
+          <p:cNvPr id="15" name="Flowchart: Alternate Process 14"/>
+          <p:cNvSpPr/>
+          <p:nvPr/>
+        </p:nvSpPr>
+        <p:spPr>
+          <a:xfrm>
+            <a:off x="3800363" y="3108832"/>
+            <a:ext cx="1524000" cy="609600"/>
+          </a:xfrm>
+          <a:prstGeom prst="flowChartAlternateProcess">
+            <a:avLst/>
+          </a:prstGeom>
+          <a:ln w="12700">
+            <a:solidFill>
+              <a:schemeClr val="tx2"/>
+            </a:solidFill>
+          </a:ln>
+        </p:spPr>
+        <p:style>
+          <a:lnRef idx="2">
+            <a:schemeClr val="accent1">
+              <a:shade val="50000"/>
+            </a:schemeClr>
+          </a:lnRef>
+          <a:fillRef idx="1">
+            <a:schemeClr val="accent1"/>
+          </a:fillRef>
+          <a:effectRef idx="0">
+            <a:schemeClr val="accent1"/>
+          </a:effectRef>
+          <a:fontRef idx="minor">
+            <a:schemeClr val="lt1"/>
+          </a:fontRef>
+        </p:style>
+        <p:txBody>
+          <a:bodyPr rtlCol="0" anchor="ctr"/>
+          <a:lstStyle/>
+          <a:p>
+            <a:pPr algn="ctr"/>
+            <a:r>
+              <a:rPr lang="en-US" sz="1400" dirty="0">
+                <a:solidFill>
+                  <a:schemeClr val="bg1"/>
+                </a:solidFill>
+              </a:rPr>
+              <a:t>Patient</a:t>
+            </a:r>
+          </a:p>
+        </p:txBody>
+      </p:sp>
+      <p:cxnSp>
+        <p:nvCxnSpPr>
+          <p:cNvPr id="17" name="Straight Arrow Connector 16"/>
+          <p:cNvCxnSpPr>
+            <a:stCxn id="6" idx="0"/>
+            <a:endCxn id="4" idx="2"/>
+          </p:cNvCxnSpPr>
+          <p:nvPr/>
+        </p:nvCxnSpPr>
+        <p:spPr>
+          <a:xfrm flipV="1">
+            <a:off x="1981200" y="2115077"/>
+            <a:ext cx="0" cy="1016938"/>
+          </a:xfrm>
+          <a:prstGeom prst="straightConnector1">
+            <a:avLst/>
+          </a:prstGeom>
+          <a:ln w="28575">
+            <a:solidFill>
+              <a:schemeClr val="tx1"/>
+            </a:solidFill>
+            <a:tailEnd type="arrow"/>
+          </a:ln>
+        </p:spPr>
+        <p:style>
+          <a:lnRef idx="1">
+            <a:schemeClr val="accent1"/>
+          </a:lnRef>
+          <a:fillRef idx="0">
+            <a:schemeClr val="accent1"/>
+          </a:fillRef>
+          <a:effectRef idx="0">
+            <a:schemeClr val="accent1"/>
+          </a:effectRef>
+          <a:fontRef idx="minor">
+            <a:schemeClr val="tx1"/>
+          </a:fontRef>
+        </p:style>
+      </p:cxnSp>
+      <p:sp>
+        <p:nvSpPr>
+          <p:cNvPr id="23" name="TextBox 22"/>
+          <p:cNvSpPr txBox="1"/>
+          <p:nvPr/>
+        </p:nvSpPr>
+        <p:spPr>
+          <a:xfrm>
+            <a:off x="1408315" y="2584238"/>
+            <a:ext cx="1143000" cy="261610"/>
+          </a:xfrm>
+          <a:prstGeom prst="rect">
+            <a:avLst/>
+          </a:prstGeom>
+          <a:solidFill>
+            <a:schemeClr val="bg1"/>
+          </a:solidFill>
+        </p:spPr>
+        <p:txBody>
+          <a:bodyPr wrap="square" rtlCol="0">
+            <a:spAutoFit/>
+          </a:bodyPr>
+          <a:lstStyle/>
+          <a:p>
+            <a:pPr algn="ctr"/>
+            <a:r>
+              <a:rPr lang="en-US" sz="1100" b="1" dirty="0"/>
+              <a:t>measure</a:t>
+            </a:r>
+          </a:p>
+        </p:txBody>
+      </p:sp>
+      <p:cxnSp>
+        <p:nvCxnSpPr>
+          <p:cNvPr id="26" name="Straight Arrow Connector 25"/>
+          <p:cNvCxnSpPr>
+            <a:cxnSpLocks/>
+            <a:stCxn id="6" idx="3"/>
+            <a:endCxn id="14" idx="1"/>
+          </p:cNvCxnSpPr>
+          <p:nvPr/>
+        </p:nvCxnSpPr>
+        <p:spPr>
+          <a:xfrm flipV="1">
+            <a:off x="2743200" y="2155696"/>
+            <a:ext cx="1041715" cy="1281119"/>
+          </a:xfrm>
+          <a:prstGeom prst="straightConnector1">
+            <a:avLst/>
+          </a:prstGeom>
+          <a:ln w="28575">
+            <a:solidFill>
+              <a:schemeClr val="tx1"/>
+            </a:solidFill>
+            <a:tailEnd type="arrow"/>
+          </a:ln>
+        </p:spPr>
+        <p:style>
+          <a:lnRef idx="1">
+            <a:schemeClr val="accent1"/>
+          </a:lnRef>
+          <a:fillRef idx="0">
+            <a:schemeClr val="accent1"/>
+          </a:fillRef>
+          <a:effectRef idx="0">
+            <a:schemeClr val="accent1"/>
+          </a:effectRef>
+          <a:fontRef idx="minor">
+            <a:schemeClr val="tx1"/>
+          </a:fontRef>
+        </p:style>
+      </p:cxnSp>
+      <p:cxnSp>
+        <p:nvCxnSpPr>
+          <p:cNvPr id="30" name="Straight Arrow Connector 29"/>
+          <p:cNvCxnSpPr>
+            <a:stCxn id="6" idx="3"/>
+            <a:endCxn id="15" idx="1"/>
+          </p:cNvCxnSpPr>
+          <p:nvPr/>
+        </p:nvCxnSpPr>
+        <p:spPr>
+          <a:xfrm flipV="1">
+            <a:off x="2743200" y="3413632"/>
+            <a:ext cx="1057163" cy="23183"/>
+          </a:xfrm>
+          <a:prstGeom prst="straightConnector1">
+            <a:avLst/>
+          </a:prstGeom>
+          <a:ln w="28575">
+            <a:solidFill>
+              <a:schemeClr val="tx1"/>
+            </a:solidFill>
+            <a:tailEnd type="arrow"/>
+          </a:ln>
+        </p:spPr>
+        <p:style>
+          <a:lnRef idx="1">
+            <a:schemeClr val="accent1"/>
+          </a:lnRef>
+          <a:fillRef idx="0">
+            <a:schemeClr val="accent1"/>
+          </a:fillRef>
+          <a:effectRef idx="0">
+            <a:schemeClr val="accent1"/>
+          </a:effectRef>
+          <a:fontRef idx="minor">
+            <a:schemeClr val="tx1"/>
+          </a:fontRef>
+        </p:style>
+      </p:cxnSp>
+      <p:sp>
+        <p:nvSpPr>
+          <p:cNvPr id="32" name="TextBox 31"/>
+          <p:cNvSpPr txBox="1"/>
+          <p:nvPr/>
+        </p:nvSpPr>
+        <p:spPr>
+          <a:xfrm>
+            <a:off x="2825636" y="2581410"/>
+            <a:ext cx="914399" cy="261610"/>
+          </a:xfrm>
+          <a:prstGeom prst="rect">
+            <a:avLst/>
+          </a:prstGeom>
+          <a:solidFill>
+            <a:schemeClr val="bg1"/>
+          </a:solidFill>
+        </p:spPr>
+        <p:txBody>
+          <a:bodyPr wrap="square" rtlCol="0">
+            <a:spAutoFit/>
+          </a:bodyPr>
+          <a:lstStyle/>
+          <a:p>
+            <a:pPr algn="ctr"/>
+            <a:r>
+              <a:rPr lang="en-US" sz="1100" b="1" dirty="0"/>
+              <a:t>reporter</a:t>
+            </a:r>
+          </a:p>
+        </p:txBody>
+      </p:sp>
+      <p:sp>
+        <p:nvSpPr>
+          <p:cNvPr id="21" name="Flowchart: Alternate Process 20">
+            <a:extLst>
+              <a:ext uri="{FF2B5EF4-FFF2-40B4-BE49-F238E27FC236}">
+                <a16:creationId xmlns:a16="http://schemas.microsoft.com/office/drawing/2014/main" id="{1D467D11-811C-4AC7-A062-1A7205B93B91}"/>
+              </a:ext>
+            </a:extLst>
+          </p:cNvPr>
+          <p:cNvSpPr/>
+          <p:nvPr/>
+        </p:nvSpPr>
+        <p:spPr>
+          <a:xfrm>
+            <a:off x="6818572" y="4960444"/>
+            <a:ext cx="1524000" cy="609600"/>
+          </a:xfrm>
+          <a:prstGeom prst="flowChartAlternateProcess">
+            <a:avLst/>
+          </a:prstGeom>
+          <a:ln w="12700">
+            <a:solidFill>
+              <a:schemeClr val="tx2"/>
+            </a:solidFill>
+          </a:ln>
+        </p:spPr>
+        <p:style>
+          <a:lnRef idx="2">
+            <a:schemeClr val="accent1">
+              <a:shade val="50000"/>
+            </a:schemeClr>
+          </a:lnRef>
+          <a:fillRef idx="1">
+            <a:schemeClr val="accent1"/>
+          </a:fillRef>
+          <a:effectRef idx="0">
+            <a:schemeClr val="accent1"/>
+          </a:effectRef>
+          <a:fontRef idx="minor">
+            <a:schemeClr val="lt1"/>
+          </a:fontRef>
+        </p:style>
+        <p:txBody>
+          <a:bodyPr rtlCol="0" anchor="ctr"/>
+          <a:lstStyle/>
+          <a:p>
+            <a:pPr algn="ctr"/>
+            <a:r>
+              <a:rPr lang="en-US" sz="1400" dirty="0">
+                <a:solidFill>
+                  <a:schemeClr val="bg1"/>
+                </a:solidFill>
+              </a:rPr>
+              <a:t>Practitioner</a:t>
+            </a:r>
+          </a:p>
+        </p:txBody>
+      </p:sp>
+      <p:sp>
+        <p:nvSpPr>
+          <p:cNvPr id="22" name="Flowchart: Alternate Process 21">
+            <a:extLst>
+              <a:ext uri="{FF2B5EF4-FFF2-40B4-BE49-F238E27FC236}">
+                <a16:creationId xmlns:a16="http://schemas.microsoft.com/office/drawing/2014/main" id="{200FCF45-8E9F-45BC-A42D-EF9F0E661DD0}"/>
+              </a:ext>
+            </a:extLst>
+          </p:cNvPr>
+          <p:cNvSpPr/>
+          <p:nvPr/>
+        </p:nvSpPr>
+        <p:spPr>
+          <a:xfrm>
+            <a:off x="6846281" y="3945284"/>
+            <a:ext cx="1524000" cy="609600"/>
+          </a:xfrm>
+          <a:prstGeom prst="flowChartAlternateProcess">
+            <a:avLst/>
+          </a:prstGeom>
+          <a:ln w="12700">
+            <a:solidFill>
+              <a:schemeClr val="tx2"/>
+            </a:solidFill>
+          </a:ln>
+        </p:spPr>
+        <p:style>
+          <a:lnRef idx="2">
+            <a:schemeClr val="accent1">
+              <a:shade val="50000"/>
+            </a:schemeClr>
+          </a:lnRef>
+          <a:fillRef idx="1">
+            <a:schemeClr val="accent1"/>
+          </a:fillRef>
+          <a:effectRef idx="0">
+            <a:schemeClr val="accent1"/>
+          </a:effectRef>
+          <a:fontRef idx="minor">
+            <a:schemeClr val="lt1"/>
+          </a:fontRef>
+        </p:style>
+        <p:txBody>
+          <a:bodyPr rtlCol="0" anchor="ctr"/>
+          <a:lstStyle/>
+          <a:p>
+            <a:pPr algn="ctr"/>
+            <a:r>
+              <a:rPr lang="en-US" sz="1400" dirty="0">
+                <a:solidFill>
+                  <a:schemeClr val="bg1"/>
+                </a:solidFill>
+              </a:rPr>
+              <a:t>Location</a:t>
+            </a:r>
+          </a:p>
+        </p:txBody>
+      </p:sp>
+      <p:sp>
+        <p:nvSpPr>
+          <p:cNvPr id="24" name="Flowchart: Alternate Process 23">
+            <a:extLst>
+              <a:ext uri="{FF2B5EF4-FFF2-40B4-BE49-F238E27FC236}">
+                <a16:creationId xmlns:a16="http://schemas.microsoft.com/office/drawing/2014/main" id="{141B92C3-9310-496C-AFD8-86FF296046B3}"/>
+              </a:ext>
+            </a:extLst>
+          </p:cNvPr>
+          <p:cNvSpPr/>
+          <p:nvPr/>
+        </p:nvSpPr>
+        <p:spPr>
+          <a:xfrm>
+            <a:off x="6849052" y="3104119"/>
+            <a:ext cx="1524000" cy="609600"/>
+          </a:xfrm>
+          <a:prstGeom prst="flowChartAlternateProcess">
+            <a:avLst/>
+          </a:prstGeom>
+          <a:ln w="12700">
+            <a:solidFill>
+              <a:schemeClr val="tx2"/>
+            </a:solidFill>
+          </a:ln>
+        </p:spPr>
+        <p:style>
+          <a:lnRef idx="2">
+            <a:schemeClr val="accent1">
+              <a:shade val="50000"/>
+            </a:schemeClr>
+          </a:lnRef>
+          <a:fillRef idx="1">
+            <a:schemeClr val="accent1"/>
+          </a:fillRef>
+          <a:effectRef idx="0">
+            <a:schemeClr val="accent1"/>
+          </a:effectRef>
+          <a:fontRef idx="minor">
+            <a:schemeClr val="lt1"/>
+          </a:fontRef>
+        </p:style>
+        <p:txBody>
+          <a:bodyPr rtlCol="0" anchor="ctr"/>
+          <a:lstStyle/>
+          <a:p>
+            <a:pPr algn="ctr"/>
+            <a:r>
+              <a:rPr lang="en-US" sz="1400" dirty="0">
+                <a:solidFill>
+                  <a:schemeClr val="bg1"/>
+                </a:solidFill>
+              </a:rPr>
+              <a:t>Coverage</a:t>
+            </a:r>
+          </a:p>
+        </p:txBody>
+      </p:sp>
+      <p:cxnSp>
+        <p:nvCxnSpPr>
+          <p:cNvPr id="13" name="Straight Arrow Connector 12">
+            <a:extLst>
+              <a:ext uri="{FF2B5EF4-FFF2-40B4-BE49-F238E27FC236}">
+                <a16:creationId xmlns:a16="http://schemas.microsoft.com/office/drawing/2014/main" id="{5B380DC1-15AC-4E85-AD84-36570C7F6C06}"/>
+              </a:ext>
+            </a:extLst>
+          </p:cNvPr>
+          <p:cNvCxnSpPr>
+            <a:cxnSpLocks/>
+            <a:stCxn id="12" idx="3"/>
+            <a:endCxn id="15" idx="2"/>
+          </p:cNvCxnSpPr>
+          <p:nvPr/>
+        </p:nvCxnSpPr>
+        <p:spPr>
+          <a:xfrm flipV="1">
+            <a:off x="3347422" y="3718432"/>
+            <a:ext cx="1214941" cy="1600915"/>
+          </a:xfrm>
+          <a:prstGeom prst="straightConnector1">
+            <a:avLst/>
+          </a:prstGeom>
+          <a:ln w="28575">
+            <a:solidFill>
+              <a:schemeClr val="tx1"/>
+            </a:solidFill>
+            <a:tailEnd type="triangle"/>
+          </a:ln>
+        </p:spPr>
+        <p:style>
+          <a:lnRef idx="1">
+            <a:schemeClr val="accent1"/>
+          </a:lnRef>
+          <a:fillRef idx="0">
+            <a:schemeClr val="accent1"/>
+          </a:fillRef>
+          <a:effectRef idx="0">
+            <a:schemeClr val="accent1"/>
+          </a:effectRef>
+          <a:fontRef idx="minor">
+            <a:schemeClr val="tx1"/>
+          </a:fontRef>
+        </p:style>
+      </p:cxnSp>
+      <p:cxnSp>
+        <p:nvCxnSpPr>
+          <p:cNvPr id="28" name="Straight Arrow Connector 27">
+            <a:extLst>
+              <a:ext uri="{FF2B5EF4-FFF2-40B4-BE49-F238E27FC236}">
+                <a16:creationId xmlns:a16="http://schemas.microsoft.com/office/drawing/2014/main" id="{EDCEF2FC-22A1-4FC1-B493-D7A7AE0F1F19}"/>
+              </a:ext>
+            </a:extLst>
+          </p:cNvPr>
+          <p:cNvCxnSpPr>
+            <a:cxnSpLocks/>
+            <a:stCxn id="12" idx="3"/>
+            <a:endCxn id="22" idx="1"/>
+          </p:cNvCxnSpPr>
+          <p:nvPr/>
+        </p:nvCxnSpPr>
+        <p:spPr>
+          <a:xfrm flipV="1">
+            <a:off x="3347422" y="4250084"/>
+            <a:ext cx="3498859" cy="1069263"/>
+          </a:xfrm>
+          <a:prstGeom prst="straightConnector1">
+            <a:avLst/>
+          </a:prstGeom>
+          <a:ln w="28575">
+            <a:solidFill>
+              <a:schemeClr val="tx1"/>
+            </a:solidFill>
+            <a:tailEnd type="triangle"/>
+          </a:ln>
+        </p:spPr>
+        <p:style>
+          <a:lnRef idx="1">
+            <a:schemeClr val="accent1"/>
+          </a:lnRef>
+          <a:fillRef idx="0">
+            <a:schemeClr val="accent1"/>
+          </a:fillRef>
+          <a:effectRef idx="0">
+            <a:schemeClr val="accent1"/>
+          </a:effectRef>
+          <a:fontRef idx="minor">
+            <a:schemeClr val="tx1"/>
+          </a:fontRef>
+        </p:style>
+      </p:cxnSp>
+      <p:cxnSp>
+        <p:nvCxnSpPr>
+          <p:cNvPr id="31" name="Straight Arrow Connector 30">
+            <a:extLst>
+              <a:ext uri="{FF2B5EF4-FFF2-40B4-BE49-F238E27FC236}">
+                <a16:creationId xmlns:a16="http://schemas.microsoft.com/office/drawing/2014/main" id="{F148622E-132E-4825-ACDE-1E31DC0B3908}"/>
+              </a:ext>
+            </a:extLst>
+          </p:cNvPr>
+          <p:cNvCxnSpPr>
+            <a:cxnSpLocks/>
+            <a:stCxn id="12" idx="3"/>
+            <a:endCxn id="21" idx="1"/>
+          </p:cNvCxnSpPr>
+          <p:nvPr/>
+        </p:nvCxnSpPr>
+        <p:spPr>
+          <a:xfrm flipV="1">
+            <a:off x="3347422" y="5265244"/>
+            <a:ext cx="3471150" cy="54103"/>
+          </a:xfrm>
+          <a:prstGeom prst="straightConnector1">
+            <a:avLst/>
+          </a:prstGeom>
+          <a:ln w="28575">
+            <a:tailEnd type="triangle"/>
+          </a:ln>
+        </p:spPr>
+        <p:style>
+          <a:lnRef idx="1">
+            <a:schemeClr val="dk1"/>
+          </a:lnRef>
+          <a:fillRef idx="0">
+            <a:schemeClr val="dk1"/>
+          </a:fillRef>
+          <a:effectRef idx="0">
+            <a:schemeClr val="dk1"/>
+          </a:effectRef>
+          <a:fontRef idx="minor">
+            <a:schemeClr val="tx1"/>
+          </a:fontRef>
+        </p:style>
+      </p:cxnSp>
+      <p:sp>
+        <p:nvSpPr>
+          <p:cNvPr id="50" name="TextBox 49">
+            <a:extLst>
+              <a:ext uri="{FF2B5EF4-FFF2-40B4-BE49-F238E27FC236}">
+                <a16:creationId xmlns:a16="http://schemas.microsoft.com/office/drawing/2014/main" id="{79A3C082-BB4F-47ED-AEA8-2DD966E87C13}"/>
+              </a:ext>
+            </a:extLst>
+          </p:cNvPr>
+          <p:cNvSpPr txBox="1"/>
+          <p:nvPr/>
+        </p:nvSpPr>
+        <p:spPr>
+          <a:xfrm>
+            <a:off x="2955364" y="3295408"/>
+            <a:ext cx="632834" cy="261610"/>
+          </a:xfrm>
+          <a:prstGeom prst="rect">
+            <a:avLst/>
+          </a:prstGeom>
+          <a:solidFill>
+            <a:schemeClr val="bg1"/>
+          </a:solidFill>
+        </p:spPr>
+        <p:txBody>
+          <a:bodyPr wrap="square" rtlCol="0">
+            <a:spAutoFit/>
+          </a:bodyPr>
+          <a:lstStyle/>
+          <a:p>
+            <a:pPr algn="ctr"/>
+            <a:r>
+              <a:rPr lang="en-US" sz="1100" b="1" dirty="0"/>
+              <a:t>subject</a:t>
+            </a:r>
+          </a:p>
+        </p:txBody>
+      </p:sp>
+      <p:sp>
+        <p:nvSpPr>
+          <p:cNvPr id="51" name="TextBox 50">
+            <a:extLst>
+              <a:ext uri="{FF2B5EF4-FFF2-40B4-BE49-F238E27FC236}">
+                <a16:creationId xmlns:a16="http://schemas.microsoft.com/office/drawing/2014/main" id="{A24F5321-ACD5-4260-8CBF-7A3DBC40D8A0}"/>
+              </a:ext>
+            </a:extLst>
+          </p:cNvPr>
+          <p:cNvSpPr txBox="1"/>
+          <p:nvPr/>
+        </p:nvSpPr>
+        <p:spPr>
+          <a:xfrm>
+            <a:off x="5584720" y="3278114"/>
+            <a:ext cx="960865" cy="261610"/>
+          </a:xfrm>
+          <a:prstGeom prst="rect">
+            <a:avLst/>
+          </a:prstGeom>
+          <a:solidFill>
+            <a:schemeClr val="bg1"/>
+          </a:solidFill>
+        </p:spPr>
+        <p:txBody>
+          <a:bodyPr wrap="square" rtlCol="0">
+            <a:spAutoFit/>
+          </a:bodyPr>
+          <a:lstStyle/>
+          <a:p>
+            <a:pPr algn="ctr"/>
+            <a:r>
+              <a:rPr lang="en-US" sz="1100" b="1" dirty="0"/>
+              <a:t>beneficiary</a:t>
+            </a:r>
+          </a:p>
+        </p:txBody>
+      </p:sp>
+      <p:sp>
+        <p:nvSpPr>
+          <p:cNvPr id="52" name="TextBox 51">
+            <a:extLst>
+              <a:ext uri="{FF2B5EF4-FFF2-40B4-BE49-F238E27FC236}">
+                <a16:creationId xmlns:a16="http://schemas.microsoft.com/office/drawing/2014/main" id="{2BDD1303-FECC-470D-B52C-36232E270AAC}"/>
+              </a:ext>
+            </a:extLst>
+          </p:cNvPr>
+          <p:cNvSpPr txBox="1"/>
+          <p:nvPr/>
+        </p:nvSpPr>
+        <p:spPr>
+          <a:xfrm>
+            <a:off x="4560780" y="4697525"/>
+            <a:ext cx="802637" cy="261610"/>
+          </a:xfrm>
+          <a:prstGeom prst="rect">
+            <a:avLst/>
+          </a:prstGeom>
+          <a:solidFill>
+            <a:schemeClr val="bg1"/>
+          </a:solidFill>
+        </p:spPr>
+        <p:txBody>
+          <a:bodyPr wrap="square" rtlCol="0">
+            <a:spAutoFit/>
+          </a:bodyPr>
+          <a:lstStyle/>
+          <a:p>
+            <a:pPr algn="ctr"/>
+            <a:r>
+              <a:rPr lang="en-US" sz="1100" b="1" dirty="0"/>
+              <a:t>location</a:t>
+            </a:r>
+          </a:p>
+        </p:txBody>
+      </p:sp>
+      <p:sp>
+        <p:nvSpPr>
+          <p:cNvPr id="53" name="TextBox 52">
+            <a:extLst>
+              <a:ext uri="{FF2B5EF4-FFF2-40B4-BE49-F238E27FC236}">
+                <a16:creationId xmlns:a16="http://schemas.microsoft.com/office/drawing/2014/main" id="{D28AB6C2-567B-4841-92B3-495FB753B3B7}"/>
+              </a:ext>
+            </a:extLst>
+          </p:cNvPr>
+          <p:cNvSpPr txBox="1"/>
+          <p:nvPr/>
+        </p:nvSpPr>
+        <p:spPr>
+          <a:xfrm>
+            <a:off x="4676081" y="5210137"/>
+            <a:ext cx="632834" cy="261610"/>
+          </a:xfrm>
+          <a:prstGeom prst="rect">
+            <a:avLst/>
+          </a:prstGeom>
+          <a:solidFill>
+            <a:schemeClr val="bg1"/>
+          </a:solidFill>
+        </p:spPr>
+        <p:txBody>
+          <a:bodyPr wrap="square" rtlCol="0">
+            <a:spAutoFit/>
+          </a:bodyPr>
+          <a:lstStyle/>
+          <a:p>
+            <a:pPr algn="ctr"/>
+            <a:r>
+              <a:rPr lang="en-US" sz="1100" b="1" dirty="0"/>
+              <a:t>owner</a:t>
+            </a:r>
+          </a:p>
+        </p:txBody>
+      </p:sp>
+      <p:sp>
+        <p:nvSpPr>
+          <p:cNvPr id="54" name="TextBox 53">
+            <a:extLst>
+              <a:ext uri="{FF2B5EF4-FFF2-40B4-BE49-F238E27FC236}">
+                <a16:creationId xmlns:a16="http://schemas.microsoft.com/office/drawing/2014/main" id="{BA5E21F4-55D2-480C-A129-6ABC9A3CF0B2}"/>
+              </a:ext>
+            </a:extLst>
+          </p:cNvPr>
+          <p:cNvSpPr txBox="1"/>
+          <p:nvPr/>
+        </p:nvSpPr>
+        <p:spPr>
+          <a:xfrm>
+            <a:off x="3654731" y="4388084"/>
+            <a:ext cx="632834" cy="261610"/>
+          </a:xfrm>
+          <a:prstGeom prst="rect">
+            <a:avLst/>
+          </a:prstGeom>
+          <a:solidFill>
+            <a:schemeClr val="bg1"/>
+          </a:solidFill>
+        </p:spPr>
+        <p:txBody>
+          <a:bodyPr wrap="square" rtlCol="0">
+            <a:spAutoFit/>
+          </a:bodyPr>
+          <a:lstStyle/>
+          <a:p>
+            <a:pPr algn="ctr"/>
+            <a:r>
+              <a:rPr lang="en-US" sz="1100" b="1" dirty="0"/>
+              <a:t>for</a:t>
+            </a:r>
+          </a:p>
+        </p:txBody>
+      </p:sp>
+      <p:cxnSp>
+        <p:nvCxnSpPr>
+          <p:cNvPr id="44" name="Straight Arrow Connector 43">
+            <a:extLst>
+              <a:ext uri="{FF2B5EF4-FFF2-40B4-BE49-F238E27FC236}">
+                <a16:creationId xmlns:a16="http://schemas.microsoft.com/office/drawing/2014/main" id="{138EF067-1B7B-4A0A-9A55-F0DE5428728B}"/>
+              </a:ext>
+            </a:extLst>
+          </p:cNvPr>
+          <p:cNvCxnSpPr>
+            <a:cxnSpLocks/>
+          </p:cNvCxnSpPr>
+          <p:nvPr/>
+        </p:nvCxnSpPr>
+        <p:spPr>
+          <a:xfrm>
+            <a:off x="1779087" y="3741615"/>
+            <a:ext cx="0" cy="1043100"/>
+          </a:xfrm>
+          <a:prstGeom prst="straightConnector1">
+            <a:avLst/>
+          </a:prstGeom>
+          <a:ln w="28575">
+            <a:solidFill>
+              <a:schemeClr val="tx1"/>
+            </a:solidFill>
+            <a:tailEnd type="triangle"/>
+          </a:ln>
+        </p:spPr>
+        <p:style>
+          <a:lnRef idx="1">
+            <a:schemeClr val="accent4"/>
+          </a:lnRef>
+          <a:fillRef idx="0">
+            <a:schemeClr val="accent4"/>
+          </a:fillRef>
+          <a:effectRef idx="0">
+            <a:schemeClr val="accent4"/>
+          </a:effectRef>
+          <a:fontRef idx="minor">
+            <a:schemeClr val="tx1"/>
+          </a:fontRef>
+        </p:style>
+      </p:cxnSp>
+      <p:cxnSp>
+        <p:nvCxnSpPr>
+          <p:cNvPr id="45" name="Straight Arrow Connector 44">
+            <a:extLst>
+              <a:ext uri="{FF2B5EF4-FFF2-40B4-BE49-F238E27FC236}">
+                <a16:creationId xmlns:a16="http://schemas.microsoft.com/office/drawing/2014/main" id="{039E68A9-08ED-4A54-A59E-D10B4DD4CB3F}"/>
+              </a:ext>
+            </a:extLst>
+          </p:cNvPr>
+          <p:cNvCxnSpPr>
+            <a:cxnSpLocks/>
+          </p:cNvCxnSpPr>
+          <p:nvPr/>
+        </p:nvCxnSpPr>
+        <p:spPr>
+          <a:xfrm>
+            <a:off x="2192228" y="3741615"/>
+            <a:ext cx="7544" cy="1272932"/>
+          </a:xfrm>
+          <a:prstGeom prst="straightConnector1">
+            <a:avLst/>
+          </a:prstGeom>
+          <a:ln w="28575">
+            <a:solidFill>
+              <a:schemeClr val="tx1"/>
+            </a:solidFill>
+            <a:tailEnd type="triangle"/>
+          </a:ln>
+        </p:spPr>
+        <p:style>
+          <a:lnRef idx="1">
+            <a:schemeClr val="accent4"/>
+          </a:lnRef>
+          <a:fillRef idx="0">
+            <a:schemeClr val="accent4"/>
+          </a:fillRef>
+          <a:effectRef idx="0">
+            <a:schemeClr val="accent4"/>
+          </a:effectRef>
+          <a:fontRef idx="minor">
+            <a:schemeClr val="tx1"/>
+          </a:fontRef>
+        </p:style>
+      </p:cxnSp>
+      <p:cxnSp>
+        <p:nvCxnSpPr>
+          <p:cNvPr id="55" name="Straight Arrow Connector 54">
+            <a:extLst>
+              <a:ext uri="{FF2B5EF4-FFF2-40B4-BE49-F238E27FC236}">
+                <a16:creationId xmlns:a16="http://schemas.microsoft.com/office/drawing/2014/main" id="{B4330CB7-F0F9-4D28-9AF9-DBAC7CF93A0A}"/>
+              </a:ext>
+            </a:extLst>
+          </p:cNvPr>
+          <p:cNvCxnSpPr>
+            <a:cxnSpLocks/>
+          </p:cNvCxnSpPr>
+          <p:nvPr/>
+        </p:nvCxnSpPr>
+        <p:spPr>
+          <a:xfrm flipH="1">
+            <a:off x="1979815" y="3741615"/>
+            <a:ext cx="1385" cy="1128549"/>
+          </a:xfrm>
+          <a:prstGeom prst="straightConnector1">
+            <a:avLst/>
+          </a:prstGeom>
+          <a:ln w="28575">
+            <a:solidFill>
+              <a:schemeClr val="tx1"/>
+            </a:solidFill>
+            <a:tailEnd type="triangle"/>
+          </a:ln>
+        </p:spPr>
+        <p:style>
+          <a:lnRef idx="1">
+            <a:schemeClr val="accent4"/>
+          </a:lnRef>
+          <a:fillRef idx="0">
+            <a:schemeClr val="accent4"/>
+          </a:fillRef>
+          <a:effectRef idx="0">
+            <a:schemeClr val="accent4"/>
+          </a:effectRef>
+          <a:fontRef idx="minor">
+            <a:schemeClr val="tx1"/>
+          </a:fontRef>
+        </p:style>
+      </p:cxnSp>
+      <p:sp>
+        <p:nvSpPr>
+          <p:cNvPr id="56" name="TextBox 55">
+            <a:extLst>
+              <a:ext uri="{FF2B5EF4-FFF2-40B4-BE49-F238E27FC236}">
+                <a16:creationId xmlns:a16="http://schemas.microsoft.com/office/drawing/2014/main" id="{E085B386-A3A7-42E8-B1CD-8039F86AECE1}"/>
+              </a:ext>
+            </a:extLst>
+          </p:cNvPr>
+          <p:cNvSpPr txBox="1"/>
+          <p:nvPr/>
+        </p:nvSpPr>
+        <p:spPr>
+          <a:xfrm>
+            <a:off x="1162050" y="4061338"/>
+            <a:ext cx="1638300" cy="261610"/>
+          </a:xfrm>
+          <a:prstGeom prst="rect">
+            <a:avLst/>
+          </a:prstGeom>
+          <a:solidFill>
+            <a:schemeClr val="bg1"/>
+          </a:solidFill>
+        </p:spPr>
+        <p:txBody>
+          <a:bodyPr wrap="square" rtlCol="0">
+            <a:spAutoFit/>
+          </a:bodyPr>
+          <a:lstStyle/>
+          <a:p>
+            <a:pPr algn="ctr"/>
+            <a:r>
+              <a:rPr lang="en-US" sz="1100" b="1" dirty="0"/>
+              <a:t>evaluatedResource</a:t>
+            </a:r>
+          </a:p>
+        </p:txBody>
+      </p:sp>
+      <p:sp>
+        <p:nvSpPr>
+          <p:cNvPr id="58" name="Content Placeholder 2">
+            <a:extLst>
+              <a:ext uri="{FF2B5EF4-FFF2-40B4-BE49-F238E27FC236}">
+                <a16:creationId xmlns:a16="http://schemas.microsoft.com/office/drawing/2014/main" id="{885786D3-FFA3-4720-AF9A-75D26151EA41}"/>
+              </a:ext>
+            </a:extLst>
+          </p:cNvPr>
+          <p:cNvSpPr txBox="1">
+            <a:spLocks/>
+          </p:cNvSpPr>
+          <p:nvPr/>
+        </p:nvSpPr>
+        <p:spPr>
+          <a:xfrm>
+            <a:off x="561281" y="358842"/>
+            <a:ext cx="8229600" cy="950672"/>
+          </a:xfrm>
+          <a:prstGeom prst="rect">
+            <a:avLst/>
+          </a:prstGeom>
+        </p:spPr>
+        <p:txBody>
+          <a:bodyPr vert="horz" lIns="91440" tIns="45720" rIns="91440" bIns="45720" rtlCol="0">
+            <a:normAutofit/>
+          </a:bodyPr>
+          <a:lstStyle>
+            <a:lvl1pPr marL="342900" indent="-342900" algn="l" defTabSz="914400" rtl="0" eaLnBrk="1" latinLnBrk="0" hangingPunct="1">
+              <a:spcBef>
+                <a:spcPct val="20000"/>
+              </a:spcBef>
+              <a:buFont typeface="Arial" panose="020B0604020202020204" pitchFamily="34" charset="0"/>
+              <a:buChar char="•"/>
+              <a:defRPr sz="3200" kern="1200">
+                <a:solidFill>
+                  <a:schemeClr val="tx1"/>
+                </a:solidFill>
+                <a:latin typeface="+mn-lt"/>
+                <a:ea typeface="+mn-ea"/>
+                <a:cs typeface="+mn-cs"/>
+              </a:defRPr>
+            </a:lvl1pPr>
+            <a:lvl2pPr marL="742950" indent="-285750" algn="l" defTabSz="914400" rtl="0" eaLnBrk="1" latinLnBrk="0" hangingPunct="1">
+              <a:spcBef>
+                <a:spcPct val="20000"/>
+              </a:spcBef>
+              <a:buFont typeface="Arial" panose="020B0604020202020204" pitchFamily="34" charset="0"/>
+              <a:buChar char="–"/>
+              <a:defRPr sz="2800" kern="1200">
+                <a:solidFill>
+                  <a:schemeClr val="tx1"/>
+                </a:solidFill>
+                <a:latin typeface="+mn-lt"/>
+                <a:ea typeface="+mn-ea"/>
+                <a:cs typeface="+mn-cs"/>
+              </a:defRPr>
+            </a:lvl2pPr>
+            <a:lvl3pPr marL="1143000" indent="-228600" algn="l" defTabSz="914400" rtl="0" eaLnBrk="1" latinLnBrk="0" hangingPunct="1">
+              <a:spcBef>
+                <a:spcPct val="20000"/>
+              </a:spcBef>
+              <a:buFont typeface="Arial" panose="020B0604020202020204" pitchFamily="34" charset="0"/>
+              <a:buChar char="•"/>
+              <a:defRPr sz="2400" kern="1200">
+                <a:solidFill>
+                  <a:schemeClr val="tx1"/>
+                </a:solidFill>
+                <a:latin typeface="+mn-lt"/>
+                <a:ea typeface="+mn-ea"/>
+                <a:cs typeface="+mn-cs"/>
+              </a:defRPr>
+            </a:lvl3pPr>
+            <a:lvl4pPr marL="1600200" indent="-228600" algn="l" defTabSz="914400" rtl="0" eaLnBrk="1" latinLnBrk="0" hangingPunct="1">
+              <a:spcBef>
+                <a:spcPct val="20000"/>
+              </a:spcBef>
+              <a:buFont typeface="Arial" panose="020B0604020202020204" pitchFamily="34" charset="0"/>
+              <a:buChar char="–"/>
+              <a:defRPr sz="2000" kern="1200">
+                <a:solidFill>
+                  <a:schemeClr val="tx1"/>
+                </a:solidFill>
+                <a:latin typeface="+mn-lt"/>
+                <a:ea typeface="+mn-ea"/>
+                <a:cs typeface="+mn-cs"/>
+              </a:defRPr>
+            </a:lvl4pPr>
+            <a:lvl5pPr marL="2057400" indent="-228600" algn="l" defTabSz="914400" rtl="0" eaLnBrk="1" latinLnBrk="0" hangingPunct="1">
+              <a:spcBef>
+                <a:spcPct val="20000"/>
+              </a:spcBef>
+              <a:buFont typeface="Arial" panose="020B0604020202020204" pitchFamily="34" charset="0"/>
+              <a:buChar char="»"/>
+              <a:defRPr sz="2000" kern="1200">
+                <a:solidFill>
+                  <a:schemeClr val="tx1"/>
+                </a:solidFill>
+                <a:latin typeface="+mn-lt"/>
+                <a:ea typeface="+mn-ea"/>
+                <a:cs typeface="+mn-cs"/>
+              </a:defRPr>
+            </a:lvl5pPr>
+            <a:lvl6pPr marL="2514600" indent="-228600" algn="l" defTabSz="914400" rtl="0" eaLnBrk="1" latinLnBrk="0" hangingPunct="1">
+              <a:spcBef>
+                <a:spcPct val="20000"/>
+              </a:spcBef>
+              <a:buFont typeface="Arial" panose="020B0604020202020204" pitchFamily="34" charset="0"/>
+              <a:buChar char="•"/>
+              <a:defRPr sz="2000" kern="1200">
+                <a:solidFill>
+                  <a:schemeClr val="tx1"/>
+                </a:solidFill>
+                <a:latin typeface="+mn-lt"/>
+                <a:ea typeface="+mn-ea"/>
+                <a:cs typeface="+mn-cs"/>
+              </a:defRPr>
+            </a:lvl6pPr>
+            <a:lvl7pPr marL="2971800" indent="-228600" algn="l" defTabSz="914400" rtl="0" eaLnBrk="1" latinLnBrk="0" hangingPunct="1">
+              <a:spcBef>
+                <a:spcPct val="20000"/>
+              </a:spcBef>
+              <a:buFont typeface="Arial" panose="020B0604020202020204" pitchFamily="34" charset="0"/>
+              <a:buChar char="•"/>
+              <a:defRPr sz="2000" kern="1200">
+                <a:solidFill>
+                  <a:schemeClr val="tx1"/>
+                </a:solidFill>
+                <a:latin typeface="+mn-lt"/>
+                <a:ea typeface="+mn-ea"/>
+                <a:cs typeface="+mn-cs"/>
+              </a:defRPr>
+            </a:lvl7pPr>
+            <a:lvl8pPr marL="3429000" indent="-228600" algn="l" defTabSz="914400" rtl="0" eaLnBrk="1" latinLnBrk="0" hangingPunct="1">
+              <a:spcBef>
+                <a:spcPct val="20000"/>
+              </a:spcBef>
+              <a:buFont typeface="Arial" panose="020B0604020202020204" pitchFamily="34" charset="0"/>
+              <a:buChar char="•"/>
+              <a:defRPr sz="2000" kern="1200">
+                <a:solidFill>
+                  <a:schemeClr val="tx1"/>
+                </a:solidFill>
+                <a:latin typeface="+mn-lt"/>
+                <a:ea typeface="+mn-ea"/>
+                <a:cs typeface="+mn-cs"/>
+              </a:defRPr>
+            </a:lvl8pPr>
+            <a:lvl9pPr marL="3886200" indent="-228600" algn="l" defTabSz="914400" rtl="0" eaLnBrk="1" latinLnBrk="0" hangingPunct="1">
+              <a:spcBef>
+                <a:spcPct val="20000"/>
+              </a:spcBef>
+              <a:buFont typeface="Arial" panose="020B0604020202020204" pitchFamily="34" charset="0"/>
+              <a:buChar char="•"/>
+              <a:defRPr sz="2000" kern="1200">
+                <a:solidFill>
+                  <a:schemeClr val="tx1"/>
+                </a:solidFill>
+                <a:latin typeface="+mn-lt"/>
+                <a:ea typeface="+mn-ea"/>
+                <a:cs typeface="+mn-cs"/>
+              </a:defRPr>
+            </a:lvl9pPr>
+          </a:lstStyle>
+          <a:p>
+            <a:r>
+              <a:rPr lang="en-US" sz="1600" dirty="0"/>
+              <a:t>Slide 5: Figure 2.1 - mrp-task.jpg </a:t>
+            </a:r>
+          </a:p>
+          <a:p>
+            <a:pPr lvl="1"/>
+            <a:r>
+              <a:rPr lang="en-US" sz="1200" dirty="0"/>
+              <a:t>Copy of slide 3, then updated to reposition some of the boxes/lines/text, added additional lines for </a:t>
+            </a:r>
+            <a:r>
+              <a:rPr lang="en-US" sz="1200" dirty="0" err="1"/>
+              <a:t>evaluatedResource</a:t>
+            </a:r>
+            <a:r>
+              <a:rPr lang="en-US" sz="1200" dirty="0"/>
+              <a:t>, changed couple of the lines’ weight to be consistent with the rest</a:t>
+            </a:r>
+          </a:p>
+          <a:p>
+            <a:endParaRPr lang="en-US" dirty="0"/>
+          </a:p>
+        </p:txBody>
+      </p:sp>
+    </p:spTree>
+    <p:extLst>
+      <p:ext uri="{BB962C8B-B14F-4D97-AF65-F5344CB8AC3E}">
+        <p14:creationId xmlns:p14="http://schemas.microsoft.com/office/powerpoint/2010/main" val="2968803823"/>
+      </p:ext>
+    </p:extLst>
+  </p:cSld>
+  <p:clrMapOvr>
+    <a:masterClrMapping/>
+  </p:clrMapOvr>
+</p:sld>
+</file>
+
+<file path=ppt/slides/slide6.xml><?xml version="1.0" encoding="utf-8"?>
+<p:sld xmlns:a="http://schemas.openxmlformats.org/drawingml/2006/main" xmlns:r="http://schemas.openxmlformats.org/officeDocument/2006/relationships" xmlns:p="http://schemas.openxmlformats.org/presentationml/2006/main">
+  <p:cSld>
+    <p:spTree>
+      <p:nvGrpSpPr>
+        <p:cNvPr id="1" name=""/>
+        <p:cNvGrpSpPr/>
+        <p:nvPr/>
+      </p:nvGrpSpPr>
+      <p:grpSpPr>
+        <a:xfrm>
+          <a:off x="0" y="0"/>
+          <a:ext cx="0" cy="0"/>
+          <a:chOff x="0" y="0"/>
+          <a:chExt cx="0" cy="0"/>
+        </a:xfrm>
+      </p:grpSpPr>
+      <p:cxnSp>
+        <p:nvCxnSpPr>
+          <p:cNvPr id="57" name="Straight Arrow Connector 56">
+            <a:extLst>
+              <a:ext uri="{FF2B5EF4-FFF2-40B4-BE49-F238E27FC236}">
+                <a16:creationId xmlns:a16="http://schemas.microsoft.com/office/drawing/2014/main" id="{8C3F4A99-F4CC-4173-AFF4-466DB7FC526E}"/>
+              </a:ext>
+            </a:extLst>
+          </p:cNvPr>
+          <p:cNvCxnSpPr>
+            <a:cxnSpLocks/>
+            <a:stCxn id="24" idx="1"/>
+            <a:endCxn id="15" idx="3"/>
+          </p:cNvCxnSpPr>
+          <p:nvPr/>
+        </p:nvCxnSpPr>
+        <p:spPr>
+          <a:xfrm flipH="1">
+            <a:off x="5324363" y="3408919"/>
+            <a:ext cx="1805466" cy="4713"/>
+          </a:xfrm>
+          <a:prstGeom prst="straightConnector1">
+            <a:avLst/>
+          </a:prstGeom>
+          <a:ln w="28575">
+            <a:solidFill>
+              <a:schemeClr val="tx1"/>
+            </a:solidFill>
+            <a:tailEnd type="triangle"/>
+          </a:ln>
+        </p:spPr>
+        <p:style>
+          <a:lnRef idx="1">
+            <a:schemeClr val="accent1"/>
+          </a:lnRef>
+          <a:fillRef idx="0">
+            <a:schemeClr val="accent1"/>
+          </a:fillRef>
+          <a:effectRef idx="0">
+            <a:schemeClr val="accent1"/>
+          </a:effectRef>
+          <a:fontRef idx="minor">
+            <a:schemeClr val="tx1"/>
+          </a:fontRef>
+        </p:style>
+      </p:cxnSp>
+      <p:sp>
+        <p:nvSpPr>
+          <p:cNvPr id="3" name="Content Placeholder 2"/>
+          <p:cNvSpPr>
+            <a:spLocks noGrp="1"/>
+          </p:cNvSpPr>
+          <p:nvPr>
+            <p:ph idx="1"/>
+          </p:nvPr>
+        </p:nvSpPr>
+        <p:spPr/>
+        <p:txBody>
+          <a:bodyPr/>
+          <a:lstStyle/>
+          <a:p>
+            <a:pPr marL="0" indent="0">
+              <a:buNone/>
+            </a:pPr>
+            <a:r>
+              <a:rPr lang="en-US" dirty="0"/>
+              <a:t>  </a:t>
+            </a:r>
+          </a:p>
+        </p:txBody>
+      </p:sp>
+      <p:sp>
+        <p:nvSpPr>
+          <p:cNvPr id="4" name="Flowchart: Alternate Process 3"/>
+          <p:cNvSpPr/>
+          <p:nvPr/>
+        </p:nvSpPr>
+        <p:spPr>
+          <a:xfrm>
+            <a:off x="1219200" y="1505477"/>
+            <a:ext cx="1524000" cy="609600"/>
+          </a:xfrm>
+          <a:prstGeom prst="flowChartAlternateProcess">
+            <a:avLst/>
+          </a:prstGeom>
+          <a:ln w="12700">
+            <a:solidFill>
+              <a:schemeClr val="tx2"/>
+            </a:solidFill>
+          </a:ln>
+        </p:spPr>
+        <p:style>
+          <a:lnRef idx="2">
+            <a:schemeClr val="accent1">
+              <a:shade val="50000"/>
+            </a:schemeClr>
+          </a:lnRef>
+          <a:fillRef idx="1">
+            <a:schemeClr val="accent1"/>
+          </a:fillRef>
+          <a:effectRef idx="0">
+            <a:schemeClr val="accent1"/>
+          </a:effectRef>
+          <a:fontRef idx="minor">
+            <a:schemeClr val="lt1"/>
+          </a:fontRef>
+        </p:style>
+        <p:txBody>
+          <a:bodyPr rtlCol="0" anchor="ctr"/>
+          <a:lstStyle/>
+          <a:p>
+            <a:pPr algn="ctr"/>
+            <a:r>
+              <a:rPr lang="en-US" sz="1400" dirty="0">
+                <a:solidFill>
+                  <a:schemeClr val="bg1"/>
+                </a:solidFill>
+              </a:rPr>
+              <a:t>Measure</a:t>
+            </a:r>
+          </a:p>
+        </p:txBody>
+      </p:sp>
+      <p:sp>
+        <p:nvSpPr>
+          <p:cNvPr id="6" name="Flowchart: Alternate Process 5"/>
+          <p:cNvSpPr/>
+          <p:nvPr/>
+        </p:nvSpPr>
+        <p:spPr>
+          <a:xfrm>
+            <a:off x="1219200" y="3132015"/>
+            <a:ext cx="1524000" cy="609600"/>
+          </a:xfrm>
+          <a:prstGeom prst="flowChartAlternateProcess">
+            <a:avLst/>
+          </a:prstGeom>
+          <a:ln w="12700">
+            <a:solidFill>
+              <a:schemeClr val="tx2"/>
+            </a:solidFill>
+          </a:ln>
+        </p:spPr>
+        <p:style>
+          <a:lnRef idx="2">
+            <a:schemeClr val="accent1">
+              <a:shade val="50000"/>
+            </a:schemeClr>
+          </a:lnRef>
+          <a:fillRef idx="1">
+            <a:schemeClr val="accent1"/>
+          </a:fillRef>
+          <a:effectRef idx="0">
+            <a:schemeClr val="accent1"/>
+          </a:effectRef>
+          <a:fontRef idx="minor">
+            <a:schemeClr val="lt1"/>
+          </a:fontRef>
+        </p:style>
+        <p:txBody>
+          <a:bodyPr rtlCol="0" anchor="ctr"/>
+          <a:lstStyle/>
+          <a:p>
+            <a:pPr algn="ctr"/>
+            <a:r>
+              <a:rPr lang="en-US" sz="1400" dirty="0">
+                <a:solidFill>
+                  <a:schemeClr val="bg1"/>
+                </a:solidFill>
+              </a:rPr>
+              <a:t>MeasureReport</a:t>
+            </a:r>
+          </a:p>
+        </p:txBody>
+      </p:sp>
+      <p:sp>
+        <p:nvSpPr>
+          <p:cNvPr id="10" name="Flowchart: Alternate Process 9"/>
+          <p:cNvSpPr/>
+          <p:nvPr/>
+        </p:nvSpPr>
+        <p:spPr>
+          <a:xfrm>
+            <a:off x="1219200" y="4758553"/>
+            <a:ext cx="1524000" cy="609600"/>
+          </a:xfrm>
+          <a:prstGeom prst="flowChartAlternateProcess">
+            <a:avLst/>
+          </a:prstGeom>
+          <a:ln w="12700">
+            <a:solidFill>
+              <a:schemeClr val="tx2"/>
+            </a:solidFill>
+          </a:ln>
+        </p:spPr>
+        <p:style>
+          <a:lnRef idx="2">
+            <a:schemeClr val="accent1">
+              <a:shade val="50000"/>
+            </a:schemeClr>
+          </a:lnRef>
+          <a:fillRef idx="1">
+            <a:schemeClr val="accent1"/>
+          </a:fillRef>
+          <a:effectRef idx="0">
+            <a:schemeClr val="accent1"/>
+          </a:effectRef>
+          <a:fontRef idx="minor">
+            <a:schemeClr val="lt1"/>
+          </a:fontRef>
+        </p:style>
+        <p:txBody>
+          <a:bodyPr rtlCol="0" anchor="ctr"/>
+          <a:lstStyle/>
+          <a:p>
+            <a:pPr algn="ctr"/>
+            <a:endParaRPr lang="en-US" sz="1400" dirty="0">
+              <a:solidFill>
+                <a:schemeClr val="bg1"/>
+              </a:solidFill>
+            </a:endParaRPr>
+          </a:p>
+        </p:txBody>
+      </p:sp>
+      <p:sp>
+        <p:nvSpPr>
+          <p:cNvPr id="11" name="Flowchart: Alternate Process 10"/>
+          <p:cNvSpPr/>
+          <p:nvPr/>
+        </p:nvSpPr>
+        <p:spPr>
+          <a:xfrm>
+            <a:off x="1443326" y="4906167"/>
+            <a:ext cx="1524000" cy="609600"/>
+          </a:xfrm>
+          <a:prstGeom prst="flowChartAlternateProcess">
+            <a:avLst/>
+          </a:prstGeom>
+          <a:ln w="12700">
+            <a:solidFill>
+              <a:schemeClr val="tx2"/>
+            </a:solidFill>
+          </a:ln>
+        </p:spPr>
+        <p:style>
+          <a:lnRef idx="2">
+            <a:schemeClr val="accent1">
+              <a:shade val="50000"/>
+            </a:schemeClr>
+          </a:lnRef>
+          <a:fillRef idx="1">
+            <a:schemeClr val="accent1"/>
+          </a:fillRef>
+          <a:effectRef idx="0">
+            <a:schemeClr val="accent1"/>
+          </a:effectRef>
+          <a:fontRef idx="minor">
+            <a:schemeClr val="lt1"/>
+          </a:fontRef>
+        </p:style>
+        <p:txBody>
+          <a:bodyPr rtlCol="0" anchor="ctr"/>
+          <a:lstStyle/>
+          <a:p>
+            <a:pPr algn="ctr"/>
+            <a:r>
+              <a:rPr lang="en-US" sz="1400" dirty="0">
+                <a:solidFill>
+                  <a:schemeClr val="bg1"/>
+                </a:solidFill>
+              </a:rPr>
+              <a:t>Observation</a:t>
+            </a:r>
+          </a:p>
+        </p:txBody>
+      </p:sp>
+      <p:sp>
+        <p:nvSpPr>
+          <p:cNvPr id="12" name="Flowchart: Alternate Process 11"/>
+          <p:cNvSpPr/>
+          <p:nvPr/>
+        </p:nvSpPr>
+        <p:spPr>
+          <a:xfrm>
+            <a:off x="1757074" y="5048356"/>
+            <a:ext cx="1524000" cy="609600"/>
+          </a:xfrm>
+          <a:prstGeom prst="flowChartAlternateProcess">
+            <a:avLst/>
+          </a:prstGeom>
+          <a:ln w="12700">
+            <a:solidFill>
+              <a:schemeClr val="tx2"/>
+            </a:solidFill>
+          </a:ln>
+        </p:spPr>
+        <p:style>
+          <a:lnRef idx="2">
+            <a:schemeClr val="accent1">
+              <a:shade val="50000"/>
+            </a:schemeClr>
+          </a:lnRef>
+          <a:fillRef idx="1">
+            <a:schemeClr val="accent1"/>
+          </a:fillRef>
+          <a:effectRef idx="0">
+            <a:schemeClr val="accent1"/>
+          </a:effectRef>
+          <a:fontRef idx="minor">
+            <a:schemeClr val="lt1"/>
+          </a:fontRef>
+        </p:style>
+        <p:txBody>
+          <a:bodyPr rtlCol="0" anchor="ctr"/>
+          <a:lstStyle/>
+          <a:p>
+            <a:pPr algn="ctr"/>
+            <a:r>
+              <a:rPr lang="en-US" sz="1400" dirty="0">
+                <a:solidFill>
+                  <a:schemeClr val="bg1"/>
+                </a:solidFill>
+              </a:rPr>
+              <a:t>Observation</a:t>
+            </a:r>
+          </a:p>
+        </p:txBody>
+      </p:sp>
+      <p:sp>
+        <p:nvSpPr>
+          <p:cNvPr id="14" name="Flowchart: Alternate Process 13"/>
+          <p:cNvSpPr/>
+          <p:nvPr/>
+        </p:nvSpPr>
+        <p:spPr>
+          <a:xfrm>
+            <a:off x="3738396" y="1859675"/>
+            <a:ext cx="1524000" cy="609600"/>
+          </a:xfrm>
+          <a:prstGeom prst="flowChartAlternateProcess">
+            <a:avLst/>
+          </a:prstGeom>
+          <a:ln w="12700">
+            <a:solidFill>
+              <a:schemeClr val="tx2"/>
+            </a:solidFill>
+          </a:ln>
+        </p:spPr>
+        <p:style>
+          <a:lnRef idx="2">
+            <a:schemeClr val="accent1">
+              <a:shade val="50000"/>
+            </a:schemeClr>
+          </a:lnRef>
+          <a:fillRef idx="1">
+            <a:schemeClr val="accent1"/>
+          </a:fillRef>
+          <a:effectRef idx="0">
+            <a:schemeClr val="accent1"/>
+          </a:effectRef>
+          <a:fontRef idx="minor">
+            <a:schemeClr val="lt1"/>
+          </a:fontRef>
+        </p:style>
+        <p:txBody>
+          <a:bodyPr rtlCol="0" anchor="ctr"/>
+          <a:lstStyle/>
+          <a:p>
+            <a:pPr algn="ctr"/>
+            <a:r>
+              <a:rPr lang="en-US" sz="1400" dirty="0">
+                <a:solidFill>
+                  <a:schemeClr val="bg1"/>
+                </a:solidFill>
+              </a:rPr>
+              <a:t>Organization</a:t>
+            </a:r>
+          </a:p>
+        </p:txBody>
+      </p:sp>
+      <p:sp>
+        <p:nvSpPr>
+          <p:cNvPr id="15" name="Flowchart: Alternate Process 14"/>
+          <p:cNvSpPr/>
+          <p:nvPr/>
+        </p:nvSpPr>
+        <p:spPr>
+          <a:xfrm>
+            <a:off x="3800363" y="3108832"/>
+            <a:ext cx="1524000" cy="609600"/>
+          </a:xfrm>
+          <a:prstGeom prst="flowChartAlternateProcess">
+            <a:avLst/>
+          </a:prstGeom>
+          <a:ln w="12700">
+            <a:solidFill>
+              <a:schemeClr val="tx2"/>
+            </a:solidFill>
+          </a:ln>
+        </p:spPr>
+        <p:style>
+          <a:lnRef idx="2">
+            <a:schemeClr val="accent1">
+              <a:shade val="50000"/>
+            </a:schemeClr>
+          </a:lnRef>
+          <a:fillRef idx="1">
+            <a:schemeClr val="accent1"/>
+          </a:fillRef>
+          <a:effectRef idx="0">
+            <a:schemeClr val="accent1"/>
+          </a:effectRef>
+          <a:fontRef idx="minor">
+            <a:schemeClr val="lt1"/>
+          </a:fontRef>
+        </p:style>
+        <p:txBody>
+          <a:bodyPr rtlCol="0" anchor="ctr"/>
+          <a:lstStyle/>
+          <a:p>
+            <a:pPr algn="ctr"/>
+            <a:r>
+              <a:rPr lang="en-US" sz="1400" dirty="0">
+                <a:solidFill>
+                  <a:schemeClr val="bg1"/>
+                </a:solidFill>
+              </a:rPr>
+              <a:t>Patient</a:t>
+            </a:r>
+          </a:p>
+        </p:txBody>
+      </p:sp>
+      <p:cxnSp>
+        <p:nvCxnSpPr>
+          <p:cNvPr id="17" name="Straight Arrow Connector 16"/>
+          <p:cNvCxnSpPr>
+            <a:stCxn id="6" idx="0"/>
+            <a:endCxn id="4" idx="2"/>
+          </p:cNvCxnSpPr>
+          <p:nvPr/>
+        </p:nvCxnSpPr>
+        <p:spPr>
+          <a:xfrm flipV="1">
+            <a:off x="1981200" y="2115077"/>
+            <a:ext cx="0" cy="1016938"/>
+          </a:xfrm>
+          <a:prstGeom prst="straightConnector1">
+            <a:avLst/>
+          </a:prstGeom>
+          <a:ln w="28575">
+            <a:solidFill>
+              <a:schemeClr val="tx1"/>
+            </a:solidFill>
+            <a:tailEnd type="arrow"/>
+          </a:ln>
+        </p:spPr>
+        <p:style>
+          <a:lnRef idx="1">
+            <a:schemeClr val="accent1"/>
+          </a:lnRef>
+          <a:fillRef idx="0">
+            <a:schemeClr val="accent1"/>
+          </a:fillRef>
+          <a:effectRef idx="0">
+            <a:schemeClr val="accent1"/>
+          </a:effectRef>
+          <a:fontRef idx="minor">
+            <a:schemeClr val="tx1"/>
+          </a:fontRef>
+        </p:style>
+      </p:cxnSp>
+      <p:sp>
+        <p:nvSpPr>
+          <p:cNvPr id="23" name="TextBox 22"/>
+          <p:cNvSpPr txBox="1"/>
+          <p:nvPr/>
+        </p:nvSpPr>
+        <p:spPr>
+          <a:xfrm>
+            <a:off x="1409700" y="2540096"/>
+            <a:ext cx="1143000" cy="261610"/>
+          </a:xfrm>
+          <a:prstGeom prst="rect">
+            <a:avLst/>
+          </a:prstGeom>
+          <a:solidFill>
+            <a:schemeClr val="bg1"/>
+          </a:solidFill>
+        </p:spPr>
+        <p:txBody>
+          <a:bodyPr wrap="square" rtlCol="0">
+            <a:spAutoFit/>
+          </a:bodyPr>
+          <a:lstStyle/>
+          <a:p>
+            <a:pPr algn="ctr"/>
+            <a:r>
+              <a:rPr lang="en-US" sz="1100" b="1" dirty="0"/>
+              <a:t>measure</a:t>
+            </a:r>
+          </a:p>
+        </p:txBody>
+      </p:sp>
+      <p:cxnSp>
+        <p:nvCxnSpPr>
+          <p:cNvPr id="26" name="Straight Arrow Connector 25"/>
+          <p:cNvCxnSpPr>
+            <a:cxnSpLocks/>
+            <a:stCxn id="6" idx="3"/>
+            <a:endCxn id="14" idx="1"/>
+          </p:cNvCxnSpPr>
+          <p:nvPr/>
+        </p:nvCxnSpPr>
+        <p:spPr>
+          <a:xfrm flipV="1">
+            <a:off x="2743200" y="2164475"/>
+            <a:ext cx="995196" cy="1272340"/>
+          </a:xfrm>
+          <a:prstGeom prst="straightConnector1">
+            <a:avLst/>
+          </a:prstGeom>
+          <a:ln w="28575">
+            <a:solidFill>
+              <a:schemeClr val="tx1"/>
+            </a:solidFill>
+            <a:tailEnd type="arrow"/>
+          </a:ln>
+        </p:spPr>
+        <p:style>
+          <a:lnRef idx="1">
+            <a:schemeClr val="accent1"/>
+          </a:lnRef>
+          <a:fillRef idx="0">
+            <a:schemeClr val="accent1"/>
+          </a:fillRef>
+          <a:effectRef idx="0">
+            <a:schemeClr val="accent1"/>
+          </a:effectRef>
+          <a:fontRef idx="minor">
+            <a:schemeClr val="tx1"/>
+          </a:fontRef>
+        </p:style>
+      </p:cxnSp>
+      <p:cxnSp>
+        <p:nvCxnSpPr>
+          <p:cNvPr id="30" name="Straight Arrow Connector 29"/>
+          <p:cNvCxnSpPr>
+            <a:stCxn id="6" idx="3"/>
+            <a:endCxn id="15" idx="1"/>
+          </p:cNvCxnSpPr>
+          <p:nvPr/>
+        </p:nvCxnSpPr>
+        <p:spPr>
+          <a:xfrm flipV="1">
+            <a:off x="2743200" y="3413632"/>
+            <a:ext cx="1057163" cy="23183"/>
+          </a:xfrm>
+          <a:prstGeom prst="straightConnector1">
+            <a:avLst/>
+          </a:prstGeom>
+          <a:ln w="28575">
+            <a:solidFill>
+              <a:schemeClr val="tx1"/>
+            </a:solidFill>
+            <a:tailEnd type="arrow"/>
+          </a:ln>
+        </p:spPr>
+        <p:style>
+          <a:lnRef idx="1">
+            <a:schemeClr val="accent1"/>
+          </a:lnRef>
+          <a:fillRef idx="0">
+            <a:schemeClr val="accent1"/>
+          </a:fillRef>
+          <a:effectRef idx="0">
+            <a:schemeClr val="accent1"/>
+          </a:effectRef>
+          <a:fontRef idx="minor">
+            <a:schemeClr val="tx1"/>
+          </a:fontRef>
+        </p:style>
+      </p:cxnSp>
+      <p:sp>
+        <p:nvSpPr>
+          <p:cNvPr id="32" name="TextBox 31"/>
+          <p:cNvSpPr txBox="1"/>
+          <p:nvPr/>
+        </p:nvSpPr>
+        <p:spPr>
+          <a:xfrm>
+            <a:off x="2800350" y="2640625"/>
+            <a:ext cx="914399" cy="261610"/>
+          </a:xfrm>
+          <a:prstGeom prst="rect">
+            <a:avLst/>
+          </a:prstGeom>
+          <a:solidFill>
+            <a:schemeClr val="bg1"/>
+          </a:solidFill>
+        </p:spPr>
+        <p:txBody>
+          <a:bodyPr wrap="square" rtlCol="0">
+            <a:spAutoFit/>
+          </a:bodyPr>
+          <a:lstStyle/>
+          <a:p>
+            <a:pPr algn="ctr"/>
+            <a:r>
+              <a:rPr lang="en-US" sz="1100" b="1" dirty="0"/>
+              <a:t>reporter</a:t>
+            </a:r>
+          </a:p>
+        </p:txBody>
+      </p:sp>
+      <p:sp>
+        <p:nvSpPr>
+          <p:cNvPr id="21" name="Flowchart: Alternate Process 20">
+            <a:extLst>
+              <a:ext uri="{FF2B5EF4-FFF2-40B4-BE49-F238E27FC236}">
+                <a16:creationId xmlns:a16="http://schemas.microsoft.com/office/drawing/2014/main" id="{1D467D11-811C-4AC7-A062-1A7205B93B91}"/>
+              </a:ext>
+            </a:extLst>
+          </p:cNvPr>
+          <p:cNvSpPr/>
+          <p:nvPr/>
+        </p:nvSpPr>
+        <p:spPr>
+          <a:xfrm>
+            <a:off x="7154487" y="5044200"/>
+            <a:ext cx="1524000" cy="609600"/>
+          </a:xfrm>
+          <a:prstGeom prst="flowChartAlternateProcess">
+            <a:avLst/>
+          </a:prstGeom>
+          <a:ln w="12700">
+            <a:solidFill>
+              <a:schemeClr val="tx2"/>
+            </a:solidFill>
+          </a:ln>
+        </p:spPr>
+        <p:style>
+          <a:lnRef idx="2">
+            <a:schemeClr val="accent1">
+              <a:shade val="50000"/>
+            </a:schemeClr>
+          </a:lnRef>
+          <a:fillRef idx="1">
+            <a:schemeClr val="accent1"/>
+          </a:fillRef>
+          <a:effectRef idx="0">
+            <a:schemeClr val="accent1"/>
+          </a:effectRef>
+          <a:fontRef idx="minor">
+            <a:schemeClr val="lt1"/>
+          </a:fontRef>
+        </p:style>
+        <p:txBody>
+          <a:bodyPr rtlCol="0" anchor="ctr"/>
+          <a:lstStyle/>
+          <a:p>
+            <a:pPr algn="ctr"/>
+            <a:r>
+              <a:rPr lang="en-US" sz="1400" dirty="0">
+                <a:solidFill>
+                  <a:schemeClr val="bg1"/>
+                </a:solidFill>
+              </a:rPr>
+              <a:t>Practitioner</a:t>
+            </a:r>
+          </a:p>
+        </p:txBody>
+      </p:sp>
+      <p:sp>
+        <p:nvSpPr>
+          <p:cNvPr id="22" name="Flowchart: Alternate Process 21">
+            <a:extLst>
+              <a:ext uri="{FF2B5EF4-FFF2-40B4-BE49-F238E27FC236}">
+                <a16:creationId xmlns:a16="http://schemas.microsoft.com/office/drawing/2014/main" id="{200FCF45-8E9F-45BC-A42D-EF9F0E661DD0}"/>
+              </a:ext>
+            </a:extLst>
+          </p:cNvPr>
+          <p:cNvSpPr/>
+          <p:nvPr/>
+        </p:nvSpPr>
+        <p:spPr>
+          <a:xfrm>
+            <a:off x="7133701" y="4038880"/>
+            <a:ext cx="1524000" cy="609600"/>
+          </a:xfrm>
+          <a:prstGeom prst="flowChartAlternateProcess">
+            <a:avLst/>
+          </a:prstGeom>
+          <a:ln w="12700">
+            <a:solidFill>
+              <a:schemeClr val="tx2"/>
+            </a:solidFill>
+          </a:ln>
+        </p:spPr>
+        <p:style>
+          <a:lnRef idx="2">
+            <a:schemeClr val="accent1">
+              <a:shade val="50000"/>
+            </a:schemeClr>
+          </a:lnRef>
+          <a:fillRef idx="1">
+            <a:schemeClr val="accent1"/>
+          </a:fillRef>
+          <a:effectRef idx="0">
+            <a:schemeClr val="accent1"/>
+          </a:effectRef>
+          <a:fontRef idx="minor">
+            <a:schemeClr val="lt1"/>
+          </a:fontRef>
+        </p:style>
+        <p:txBody>
+          <a:bodyPr rtlCol="0" anchor="ctr"/>
+          <a:lstStyle/>
+          <a:p>
+            <a:pPr algn="ctr"/>
+            <a:r>
+              <a:rPr lang="en-US" sz="1400" dirty="0">
+                <a:solidFill>
+                  <a:schemeClr val="bg1"/>
+                </a:solidFill>
+              </a:rPr>
+              <a:t>Location</a:t>
+            </a:r>
+          </a:p>
+        </p:txBody>
+      </p:sp>
+      <p:sp>
+        <p:nvSpPr>
+          <p:cNvPr id="24" name="Flowchart: Alternate Process 23">
+            <a:extLst>
+              <a:ext uri="{FF2B5EF4-FFF2-40B4-BE49-F238E27FC236}">
+                <a16:creationId xmlns:a16="http://schemas.microsoft.com/office/drawing/2014/main" id="{141B92C3-9310-496C-AFD8-86FF296046B3}"/>
+              </a:ext>
+            </a:extLst>
+          </p:cNvPr>
+          <p:cNvSpPr/>
+          <p:nvPr/>
+        </p:nvSpPr>
+        <p:spPr>
+          <a:xfrm>
+            <a:off x="7129829" y="3104119"/>
+            <a:ext cx="1524000" cy="609600"/>
+          </a:xfrm>
+          <a:prstGeom prst="flowChartAlternateProcess">
+            <a:avLst/>
+          </a:prstGeom>
+          <a:ln w="12700">
+            <a:solidFill>
+              <a:schemeClr val="tx2"/>
+            </a:solidFill>
+          </a:ln>
+        </p:spPr>
+        <p:style>
+          <a:lnRef idx="2">
+            <a:schemeClr val="accent1">
+              <a:shade val="50000"/>
+            </a:schemeClr>
+          </a:lnRef>
+          <a:fillRef idx="1">
+            <a:schemeClr val="accent1"/>
+          </a:fillRef>
+          <a:effectRef idx="0">
+            <a:schemeClr val="accent1"/>
+          </a:effectRef>
+          <a:fontRef idx="minor">
+            <a:schemeClr val="lt1"/>
+          </a:fontRef>
+        </p:style>
+        <p:txBody>
+          <a:bodyPr rtlCol="0" anchor="ctr"/>
+          <a:lstStyle/>
+          <a:p>
+            <a:pPr algn="ctr"/>
+            <a:r>
+              <a:rPr lang="en-US" sz="1400" dirty="0">
+                <a:solidFill>
+                  <a:schemeClr val="bg1"/>
+                </a:solidFill>
+              </a:rPr>
+              <a:t>Coverage</a:t>
+            </a:r>
+          </a:p>
+        </p:txBody>
+      </p:sp>
+      <p:cxnSp>
+        <p:nvCxnSpPr>
+          <p:cNvPr id="13" name="Straight Arrow Connector 12">
+            <a:extLst>
+              <a:ext uri="{FF2B5EF4-FFF2-40B4-BE49-F238E27FC236}">
+                <a16:creationId xmlns:a16="http://schemas.microsoft.com/office/drawing/2014/main" id="{5B380DC1-15AC-4E85-AD84-36570C7F6C06}"/>
+              </a:ext>
+            </a:extLst>
+          </p:cNvPr>
+          <p:cNvCxnSpPr>
+            <a:cxnSpLocks/>
+            <a:stCxn id="12" idx="3"/>
+            <a:endCxn id="15" idx="2"/>
+          </p:cNvCxnSpPr>
+          <p:nvPr/>
+        </p:nvCxnSpPr>
+        <p:spPr>
+          <a:xfrm flipV="1">
+            <a:off x="3281074" y="3718432"/>
+            <a:ext cx="1281289" cy="1634724"/>
+          </a:xfrm>
+          <a:prstGeom prst="straightConnector1">
+            <a:avLst/>
+          </a:prstGeom>
+          <a:ln w="28575">
+            <a:solidFill>
+              <a:schemeClr val="tx1"/>
+            </a:solidFill>
+            <a:tailEnd type="triangle"/>
+          </a:ln>
+        </p:spPr>
+        <p:style>
+          <a:lnRef idx="1">
+            <a:schemeClr val="accent1"/>
+          </a:lnRef>
+          <a:fillRef idx="0">
+            <a:schemeClr val="accent1"/>
+          </a:fillRef>
+          <a:effectRef idx="0">
+            <a:schemeClr val="accent1"/>
+          </a:effectRef>
+          <a:fontRef idx="minor">
+            <a:schemeClr val="tx1"/>
+          </a:fontRef>
+        </p:style>
+      </p:cxnSp>
+      <p:cxnSp>
+        <p:nvCxnSpPr>
+          <p:cNvPr id="28" name="Straight Arrow Connector 27">
+            <a:extLst>
+              <a:ext uri="{FF2B5EF4-FFF2-40B4-BE49-F238E27FC236}">
+                <a16:creationId xmlns:a16="http://schemas.microsoft.com/office/drawing/2014/main" id="{EDCEF2FC-22A1-4FC1-B493-D7A7AE0F1F19}"/>
+              </a:ext>
+            </a:extLst>
+          </p:cNvPr>
+          <p:cNvCxnSpPr>
+            <a:cxnSpLocks/>
+            <a:stCxn id="33" idx="3"/>
+            <a:endCxn id="22" idx="1"/>
+          </p:cNvCxnSpPr>
+          <p:nvPr/>
+        </p:nvCxnSpPr>
+        <p:spPr>
+          <a:xfrm flipV="1">
+            <a:off x="6158160" y="4343680"/>
+            <a:ext cx="975541" cy="3989"/>
+          </a:xfrm>
+          <a:prstGeom prst="straightConnector1">
+            <a:avLst/>
+          </a:prstGeom>
+          <a:ln w="28575">
+            <a:solidFill>
+              <a:schemeClr val="tx1"/>
+            </a:solidFill>
+            <a:tailEnd type="triangle"/>
+          </a:ln>
+        </p:spPr>
+        <p:style>
+          <a:lnRef idx="1">
+            <a:schemeClr val="accent1"/>
+          </a:lnRef>
+          <a:fillRef idx="0">
+            <a:schemeClr val="accent1"/>
+          </a:fillRef>
+          <a:effectRef idx="0">
+            <a:schemeClr val="accent1"/>
+          </a:effectRef>
+          <a:fontRef idx="minor">
+            <a:schemeClr val="tx1"/>
+          </a:fontRef>
+        </p:style>
+      </p:cxnSp>
+      <p:cxnSp>
+        <p:nvCxnSpPr>
+          <p:cNvPr id="31" name="Straight Arrow Connector 30">
+            <a:extLst>
+              <a:ext uri="{FF2B5EF4-FFF2-40B4-BE49-F238E27FC236}">
+                <a16:creationId xmlns:a16="http://schemas.microsoft.com/office/drawing/2014/main" id="{F148622E-132E-4825-ACDE-1E31DC0B3908}"/>
+              </a:ext>
+            </a:extLst>
+          </p:cNvPr>
+          <p:cNvCxnSpPr>
+            <a:cxnSpLocks/>
+            <a:stCxn id="12" idx="3"/>
+            <a:endCxn id="21" idx="1"/>
+          </p:cNvCxnSpPr>
+          <p:nvPr/>
+        </p:nvCxnSpPr>
+        <p:spPr>
+          <a:xfrm flipV="1">
+            <a:off x="3281074" y="5349000"/>
+            <a:ext cx="3873413" cy="4156"/>
+          </a:xfrm>
+          <a:prstGeom prst="straightConnector1">
+            <a:avLst/>
+          </a:prstGeom>
+          <a:ln w="28575">
+            <a:tailEnd type="triangle"/>
+          </a:ln>
+        </p:spPr>
+        <p:style>
+          <a:lnRef idx="1">
+            <a:schemeClr val="dk1"/>
+          </a:lnRef>
+          <a:fillRef idx="0">
+            <a:schemeClr val="dk1"/>
+          </a:fillRef>
+          <a:effectRef idx="0">
+            <a:schemeClr val="dk1"/>
+          </a:effectRef>
+          <a:fontRef idx="minor">
+            <a:schemeClr val="tx1"/>
+          </a:fontRef>
+        </p:style>
+      </p:cxnSp>
+      <p:sp>
+        <p:nvSpPr>
+          <p:cNvPr id="50" name="TextBox 49">
+            <a:extLst>
+              <a:ext uri="{FF2B5EF4-FFF2-40B4-BE49-F238E27FC236}">
+                <a16:creationId xmlns:a16="http://schemas.microsoft.com/office/drawing/2014/main" id="{79A3C082-BB4F-47ED-AEA8-2DD966E87C13}"/>
+              </a:ext>
+            </a:extLst>
+          </p:cNvPr>
+          <p:cNvSpPr txBox="1"/>
+          <p:nvPr/>
+        </p:nvSpPr>
+        <p:spPr>
+          <a:xfrm>
+            <a:off x="2950025" y="3316013"/>
+            <a:ext cx="632834" cy="261610"/>
+          </a:xfrm>
+          <a:prstGeom prst="rect">
+            <a:avLst/>
+          </a:prstGeom>
+          <a:solidFill>
+            <a:schemeClr val="bg1"/>
+          </a:solidFill>
+        </p:spPr>
+        <p:txBody>
+          <a:bodyPr wrap="square" rtlCol="0">
+            <a:spAutoFit/>
+          </a:bodyPr>
+          <a:lstStyle/>
+          <a:p>
+            <a:pPr algn="ctr"/>
+            <a:r>
+              <a:rPr lang="en-US" sz="1100" b="1" dirty="0"/>
+              <a:t>subject</a:t>
+            </a:r>
+          </a:p>
+        </p:txBody>
+      </p:sp>
+      <p:sp>
+        <p:nvSpPr>
+          <p:cNvPr id="51" name="TextBox 50">
+            <a:extLst>
+              <a:ext uri="{FF2B5EF4-FFF2-40B4-BE49-F238E27FC236}">
+                <a16:creationId xmlns:a16="http://schemas.microsoft.com/office/drawing/2014/main" id="{A24F5321-ACD5-4260-8CBF-7A3DBC40D8A0}"/>
+              </a:ext>
+            </a:extLst>
+          </p:cNvPr>
+          <p:cNvSpPr txBox="1"/>
+          <p:nvPr/>
+        </p:nvSpPr>
+        <p:spPr>
+          <a:xfrm>
+            <a:off x="5766801" y="3269862"/>
+            <a:ext cx="960865" cy="261610"/>
+          </a:xfrm>
+          <a:prstGeom prst="rect">
+            <a:avLst/>
+          </a:prstGeom>
+          <a:solidFill>
+            <a:schemeClr val="bg1"/>
+          </a:solidFill>
+        </p:spPr>
+        <p:txBody>
+          <a:bodyPr wrap="square" rtlCol="0">
+            <a:spAutoFit/>
+          </a:bodyPr>
+          <a:lstStyle/>
+          <a:p>
+            <a:pPr algn="ctr"/>
+            <a:r>
+              <a:rPr lang="en-US" sz="1100" b="1" dirty="0"/>
+              <a:t>beneficiary</a:t>
+            </a:r>
+          </a:p>
+        </p:txBody>
+      </p:sp>
+      <p:sp>
+        <p:nvSpPr>
+          <p:cNvPr id="53" name="TextBox 52">
+            <a:extLst>
+              <a:ext uri="{FF2B5EF4-FFF2-40B4-BE49-F238E27FC236}">
+                <a16:creationId xmlns:a16="http://schemas.microsoft.com/office/drawing/2014/main" id="{D28AB6C2-567B-4841-92B3-495FB753B3B7}"/>
+              </a:ext>
+            </a:extLst>
+          </p:cNvPr>
+          <p:cNvSpPr txBox="1"/>
+          <p:nvPr/>
+        </p:nvSpPr>
+        <p:spPr>
+          <a:xfrm>
+            <a:off x="4769963" y="5209854"/>
+            <a:ext cx="789487" cy="261610"/>
+          </a:xfrm>
+          <a:prstGeom prst="rect">
+            <a:avLst/>
+          </a:prstGeom>
+          <a:solidFill>
+            <a:schemeClr val="bg1"/>
+          </a:solidFill>
+        </p:spPr>
+        <p:txBody>
+          <a:bodyPr wrap="square" rtlCol="0">
+            <a:spAutoFit/>
+          </a:bodyPr>
+          <a:lstStyle/>
+          <a:p>
+            <a:pPr algn="ctr"/>
+            <a:r>
+              <a:rPr lang="en-US" sz="1100" b="1" dirty="0"/>
+              <a:t>performer</a:t>
+            </a:r>
+          </a:p>
+        </p:txBody>
+      </p:sp>
+      <p:sp>
+        <p:nvSpPr>
+          <p:cNvPr id="54" name="TextBox 53">
+            <a:extLst>
+              <a:ext uri="{FF2B5EF4-FFF2-40B4-BE49-F238E27FC236}">
+                <a16:creationId xmlns:a16="http://schemas.microsoft.com/office/drawing/2014/main" id="{BA5E21F4-55D2-480C-A129-6ABC9A3CF0B2}"/>
+              </a:ext>
+            </a:extLst>
+          </p:cNvPr>
+          <p:cNvSpPr txBox="1"/>
+          <p:nvPr/>
+        </p:nvSpPr>
+        <p:spPr>
+          <a:xfrm>
+            <a:off x="3675136" y="4249963"/>
+            <a:ext cx="632834" cy="261610"/>
+          </a:xfrm>
+          <a:prstGeom prst="rect">
+            <a:avLst/>
+          </a:prstGeom>
+          <a:solidFill>
+            <a:schemeClr val="bg1"/>
+          </a:solidFill>
+        </p:spPr>
+        <p:txBody>
+          <a:bodyPr wrap="square" rtlCol="0">
+            <a:spAutoFit/>
+          </a:bodyPr>
+          <a:lstStyle/>
+          <a:p>
+            <a:pPr algn="ctr"/>
+            <a:r>
+              <a:rPr lang="en-US" sz="1100" b="1" dirty="0"/>
+              <a:t>subject</a:t>
+            </a:r>
+          </a:p>
+        </p:txBody>
+      </p:sp>
+      <p:sp>
+        <p:nvSpPr>
+          <p:cNvPr id="33" name="Flowchart: Alternate Process 32">
+            <a:extLst>
+              <a:ext uri="{FF2B5EF4-FFF2-40B4-BE49-F238E27FC236}">
+                <a16:creationId xmlns:a16="http://schemas.microsoft.com/office/drawing/2014/main" id="{4A006A61-8BFB-4E4C-BE3B-6E8109026DF0}"/>
+              </a:ext>
+            </a:extLst>
+          </p:cNvPr>
+          <p:cNvSpPr/>
+          <p:nvPr/>
+        </p:nvSpPr>
+        <p:spPr>
+          <a:xfrm>
+            <a:off x="4634160" y="4042869"/>
+            <a:ext cx="1524000" cy="609600"/>
+          </a:xfrm>
+          <a:prstGeom prst="flowChartAlternateProcess">
+            <a:avLst/>
+          </a:prstGeom>
+          <a:ln w="12700">
+            <a:solidFill>
+              <a:schemeClr val="tx2"/>
+            </a:solidFill>
+          </a:ln>
+        </p:spPr>
+        <p:style>
+          <a:lnRef idx="2">
+            <a:schemeClr val="accent1">
+              <a:shade val="50000"/>
+            </a:schemeClr>
+          </a:lnRef>
+          <a:fillRef idx="1">
+            <a:schemeClr val="accent1"/>
+          </a:fillRef>
+          <a:effectRef idx="0">
+            <a:schemeClr val="accent1"/>
+          </a:effectRef>
+          <a:fontRef idx="minor">
+            <a:schemeClr val="lt1"/>
+          </a:fontRef>
+        </p:style>
+        <p:txBody>
+          <a:bodyPr rtlCol="0" anchor="ctr"/>
+          <a:lstStyle/>
+          <a:p>
+            <a:pPr algn="ctr"/>
+            <a:r>
+              <a:rPr lang="en-US" sz="1400" dirty="0">
+                <a:solidFill>
+                  <a:schemeClr val="bg1"/>
+                </a:solidFill>
+              </a:rPr>
+              <a:t>Encounter</a:t>
+            </a:r>
+          </a:p>
+        </p:txBody>
+      </p:sp>
+      <p:cxnSp>
+        <p:nvCxnSpPr>
+          <p:cNvPr id="35" name="Straight Arrow Connector 34">
+            <a:extLst>
+              <a:ext uri="{FF2B5EF4-FFF2-40B4-BE49-F238E27FC236}">
+                <a16:creationId xmlns:a16="http://schemas.microsoft.com/office/drawing/2014/main" id="{56C4E27D-2F4B-4511-B6E2-8548000E1BB3}"/>
+              </a:ext>
+            </a:extLst>
+          </p:cNvPr>
+          <p:cNvCxnSpPr>
+            <a:cxnSpLocks/>
+            <a:stCxn id="12" idx="3"/>
+            <a:endCxn id="33" idx="1"/>
+          </p:cNvCxnSpPr>
+          <p:nvPr/>
+        </p:nvCxnSpPr>
+        <p:spPr>
+          <a:xfrm flipV="1">
+            <a:off x="3281074" y="4347669"/>
+            <a:ext cx="1353086" cy="1005487"/>
+          </a:xfrm>
+          <a:prstGeom prst="straightConnector1">
+            <a:avLst/>
+          </a:prstGeom>
+          <a:ln w="28575">
+            <a:solidFill>
+              <a:schemeClr val="tx1"/>
+            </a:solidFill>
+            <a:tailEnd type="triangle"/>
+          </a:ln>
+        </p:spPr>
+        <p:style>
+          <a:lnRef idx="1">
+            <a:schemeClr val="accent1"/>
+          </a:lnRef>
+          <a:fillRef idx="0">
+            <a:schemeClr val="accent1"/>
+          </a:fillRef>
+          <a:effectRef idx="0">
+            <a:schemeClr val="accent1"/>
+          </a:effectRef>
+          <a:fontRef idx="minor">
+            <a:schemeClr val="tx1"/>
+          </a:fontRef>
+        </p:style>
+      </p:cxnSp>
+      <p:sp>
+        <p:nvSpPr>
+          <p:cNvPr id="42" name="TextBox 41">
+            <a:extLst>
+              <a:ext uri="{FF2B5EF4-FFF2-40B4-BE49-F238E27FC236}">
+                <a16:creationId xmlns:a16="http://schemas.microsoft.com/office/drawing/2014/main" id="{F80DB66C-32C8-48F3-A042-BC2228C71973}"/>
+              </a:ext>
+            </a:extLst>
+          </p:cNvPr>
+          <p:cNvSpPr txBox="1"/>
+          <p:nvPr/>
+        </p:nvSpPr>
+        <p:spPr>
+          <a:xfrm>
+            <a:off x="6256202" y="4228720"/>
+            <a:ext cx="753395" cy="261610"/>
+          </a:xfrm>
+          <a:prstGeom prst="rect">
+            <a:avLst/>
+          </a:prstGeom>
+          <a:solidFill>
+            <a:schemeClr val="bg1"/>
+          </a:solidFill>
+        </p:spPr>
+        <p:txBody>
+          <a:bodyPr wrap="square" rtlCol="0">
+            <a:spAutoFit/>
+          </a:bodyPr>
+          <a:lstStyle/>
+          <a:p>
+            <a:pPr algn="ctr"/>
+            <a:r>
+              <a:rPr lang="en-US" sz="1100" b="1" dirty="0"/>
+              <a:t>location</a:t>
+            </a:r>
+          </a:p>
+        </p:txBody>
+      </p:sp>
+      <p:sp>
+        <p:nvSpPr>
+          <p:cNvPr id="55" name="TextBox 54">
+            <a:extLst>
+              <a:ext uri="{FF2B5EF4-FFF2-40B4-BE49-F238E27FC236}">
+                <a16:creationId xmlns:a16="http://schemas.microsoft.com/office/drawing/2014/main" id="{9ADAAAB4-9245-4DD2-93B0-86CB09B2D464}"/>
+              </a:ext>
+            </a:extLst>
+          </p:cNvPr>
+          <p:cNvSpPr txBox="1"/>
+          <p:nvPr/>
+        </p:nvSpPr>
+        <p:spPr>
+          <a:xfrm>
+            <a:off x="3864541" y="4650903"/>
+            <a:ext cx="790769" cy="261610"/>
+          </a:xfrm>
+          <a:prstGeom prst="rect">
+            <a:avLst/>
+          </a:prstGeom>
+          <a:solidFill>
+            <a:schemeClr val="bg1"/>
+          </a:solidFill>
+        </p:spPr>
+        <p:txBody>
+          <a:bodyPr wrap="square" rtlCol="0">
+            <a:spAutoFit/>
+          </a:bodyPr>
+          <a:lstStyle/>
+          <a:p>
+            <a:pPr algn="ctr"/>
+            <a:r>
+              <a:rPr lang="en-US" sz="1100" b="1" dirty="0"/>
+              <a:t>encounter</a:t>
+            </a:r>
+          </a:p>
+        </p:txBody>
+      </p:sp>
+      <p:cxnSp>
+        <p:nvCxnSpPr>
+          <p:cNvPr id="36" name="Straight Arrow Connector 35">
+            <a:extLst>
+              <a:ext uri="{FF2B5EF4-FFF2-40B4-BE49-F238E27FC236}">
+                <a16:creationId xmlns:a16="http://schemas.microsoft.com/office/drawing/2014/main" id="{FCDD9D60-F777-4705-9D7E-8BB05516456B}"/>
+              </a:ext>
+            </a:extLst>
+          </p:cNvPr>
+          <p:cNvCxnSpPr>
+            <a:cxnSpLocks/>
+          </p:cNvCxnSpPr>
+          <p:nvPr/>
+        </p:nvCxnSpPr>
+        <p:spPr>
+          <a:xfrm>
+            <a:off x="1779087" y="3741615"/>
+            <a:ext cx="0" cy="1043100"/>
+          </a:xfrm>
+          <a:prstGeom prst="straightConnector1">
+            <a:avLst/>
+          </a:prstGeom>
+          <a:ln w="28575">
+            <a:solidFill>
+              <a:schemeClr val="tx1"/>
+            </a:solidFill>
+            <a:tailEnd type="triangle"/>
+          </a:ln>
+        </p:spPr>
+        <p:style>
+          <a:lnRef idx="1">
+            <a:schemeClr val="accent4"/>
+          </a:lnRef>
+          <a:fillRef idx="0">
+            <a:schemeClr val="accent4"/>
+          </a:fillRef>
+          <a:effectRef idx="0">
+            <a:schemeClr val="accent4"/>
+          </a:effectRef>
+          <a:fontRef idx="minor">
+            <a:schemeClr val="tx1"/>
+          </a:fontRef>
+        </p:style>
+      </p:cxnSp>
+      <p:cxnSp>
+        <p:nvCxnSpPr>
+          <p:cNvPr id="46" name="Straight Arrow Connector 45">
+            <a:extLst>
+              <a:ext uri="{FF2B5EF4-FFF2-40B4-BE49-F238E27FC236}">
+                <a16:creationId xmlns:a16="http://schemas.microsoft.com/office/drawing/2014/main" id="{6D485E48-68D1-47B8-AC87-829C3BC7D7E4}"/>
+              </a:ext>
+            </a:extLst>
+          </p:cNvPr>
+          <p:cNvCxnSpPr>
+            <a:cxnSpLocks/>
+          </p:cNvCxnSpPr>
+          <p:nvPr/>
+        </p:nvCxnSpPr>
+        <p:spPr>
+          <a:xfrm>
+            <a:off x="1981200" y="3741615"/>
+            <a:ext cx="0" cy="1164552"/>
+          </a:xfrm>
+          <a:prstGeom prst="straightConnector1">
+            <a:avLst/>
+          </a:prstGeom>
+          <a:ln w="28575">
+            <a:solidFill>
+              <a:schemeClr val="tx1"/>
+            </a:solidFill>
+            <a:tailEnd type="triangle"/>
+          </a:ln>
+        </p:spPr>
+        <p:style>
+          <a:lnRef idx="1">
+            <a:schemeClr val="accent4"/>
+          </a:lnRef>
+          <a:fillRef idx="0">
+            <a:schemeClr val="accent4"/>
+          </a:fillRef>
+          <a:effectRef idx="0">
+            <a:schemeClr val="accent4"/>
+          </a:effectRef>
+          <a:fontRef idx="minor">
+            <a:schemeClr val="tx1"/>
+          </a:fontRef>
+        </p:style>
+      </p:cxnSp>
+      <p:cxnSp>
+        <p:nvCxnSpPr>
+          <p:cNvPr id="47" name="Straight Arrow Connector 46">
+            <a:extLst>
+              <a:ext uri="{FF2B5EF4-FFF2-40B4-BE49-F238E27FC236}">
+                <a16:creationId xmlns:a16="http://schemas.microsoft.com/office/drawing/2014/main" id="{248CDC19-3B15-4255-ACAB-46F5A5C5EA42}"/>
+              </a:ext>
+            </a:extLst>
+          </p:cNvPr>
+          <p:cNvCxnSpPr>
+            <a:cxnSpLocks/>
+          </p:cNvCxnSpPr>
+          <p:nvPr/>
+        </p:nvCxnSpPr>
+        <p:spPr>
+          <a:xfrm>
+            <a:off x="2205326" y="3741615"/>
+            <a:ext cx="0" cy="1306741"/>
+          </a:xfrm>
+          <a:prstGeom prst="straightConnector1">
+            <a:avLst/>
+          </a:prstGeom>
+          <a:ln w="28575">
+            <a:solidFill>
+              <a:schemeClr val="tx1"/>
+            </a:solidFill>
+            <a:tailEnd type="triangle"/>
+          </a:ln>
+        </p:spPr>
+        <p:style>
+          <a:lnRef idx="1">
+            <a:schemeClr val="accent4"/>
+          </a:lnRef>
+          <a:fillRef idx="0">
+            <a:schemeClr val="accent4"/>
+          </a:fillRef>
+          <a:effectRef idx="0">
+            <a:schemeClr val="accent4"/>
+          </a:effectRef>
+          <a:fontRef idx="minor">
+            <a:schemeClr val="tx1"/>
+          </a:fontRef>
+        </p:style>
+      </p:cxnSp>
+      <p:sp>
+        <p:nvSpPr>
+          <p:cNvPr id="49" name="TextBox 48">
+            <a:extLst>
+              <a:ext uri="{FF2B5EF4-FFF2-40B4-BE49-F238E27FC236}">
+                <a16:creationId xmlns:a16="http://schemas.microsoft.com/office/drawing/2014/main" id="{24B117C9-CC52-40EE-A1D6-588124D86F6F}"/>
+              </a:ext>
+            </a:extLst>
+          </p:cNvPr>
+          <p:cNvSpPr txBox="1"/>
+          <p:nvPr/>
+        </p:nvSpPr>
+        <p:spPr>
+          <a:xfrm>
+            <a:off x="1162050" y="4061338"/>
+            <a:ext cx="1638300" cy="261610"/>
+          </a:xfrm>
+          <a:prstGeom prst="rect">
+            <a:avLst/>
+          </a:prstGeom>
+          <a:solidFill>
+            <a:schemeClr val="bg1"/>
+          </a:solidFill>
+        </p:spPr>
+        <p:txBody>
+          <a:bodyPr wrap="square" rtlCol="0">
+            <a:spAutoFit/>
+          </a:bodyPr>
+          <a:lstStyle/>
+          <a:p>
+            <a:pPr algn="ctr"/>
+            <a:r>
+              <a:rPr lang="en-US" sz="1100" b="1" dirty="0"/>
+              <a:t>evaluatedResource</a:t>
+            </a:r>
+          </a:p>
+        </p:txBody>
+      </p:sp>
+      <p:sp>
+        <p:nvSpPr>
+          <p:cNvPr id="63" name="Content Placeholder 2">
+            <a:extLst>
+              <a:ext uri="{FF2B5EF4-FFF2-40B4-BE49-F238E27FC236}">
+                <a16:creationId xmlns:a16="http://schemas.microsoft.com/office/drawing/2014/main" id="{035C0597-CD4F-45DE-87D8-E8F589CD93A5}"/>
+              </a:ext>
+            </a:extLst>
+          </p:cNvPr>
+          <p:cNvSpPr txBox="1">
+            <a:spLocks/>
+          </p:cNvSpPr>
+          <p:nvPr/>
+        </p:nvSpPr>
+        <p:spPr>
+          <a:xfrm>
+            <a:off x="561281" y="358842"/>
+            <a:ext cx="8229600" cy="950672"/>
+          </a:xfrm>
+          <a:prstGeom prst="rect">
+            <a:avLst/>
+          </a:prstGeom>
+        </p:spPr>
+        <p:txBody>
+          <a:bodyPr vert="horz" lIns="91440" tIns="45720" rIns="91440" bIns="45720" rtlCol="0">
+            <a:normAutofit/>
+          </a:bodyPr>
+          <a:lstStyle>
+            <a:lvl1pPr marL="342900" indent="-342900" algn="l" defTabSz="914400" rtl="0" eaLnBrk="1" latinLnBrk="0" hangingPunct="1">
+              <a:spcBef>
+                <a:spcPct val="20000"/>
+              </a:spcBef>
+              <a:buFont typeface="Arial" panose="020B0604020202020204" pitchFamily="34" charset="0"/>
+              <a:buChar char="•"/>
+              <a:defRPr sz="3200" kern="1200">
+                <a:solidFill>
+                  <a:schemeClr val="tx1"/>
+                </a:solidFill>
+                <a:latin typeface="+mn-lt"/>
+                <a:ea typeface="+mn-ea"/>
+                <a:cs typeface="+mn-cs"/>
+              </a:defRPr>
+            </a:lvl1pPr>
+            <a:lvl2pPr marL="742950" indent="-285750" algn="l" defTabSz="914400" rtl="0" eaLnBrk="1" latinLnBrk="0" hangingPunct="1">
+              <a:spcBef>
+                <a:spcPct val="20000"/>
+              </a:spcBef>
+              <a:buFont typeface="Arial" panose="020B0604020202020204" pitchFamily="34" charset="0"/>
+              <a:buChar char="–"/>
+              <a:defRPr sz="2800" kern="1200">
+                <a:solidFill>
+                  <a:schemeClr val="tx1"/>
+                </a:solidFill>
+                <a:latin typeface="+mn-lt"/>
+                <a:ea typeface="+mn-ea"/>
+                <a:cs typeface="+mn-cs"/>
+              </a:defRPr>
+            </a:lvl2pPr>
+            <a:lvl3pPr marL="1143000" indent="-228600" algn="l" defTabSz="914400" rtl="0" eaLnBrk="1" latinLnBrk="0" hangingPunct="1">
+              <a:spcBef>
+                <a:spcPct val="20000"/>
+              </a:spcBef>
+              <a:buFont typeface="Arial" panose="020B0604020202020204" pitchFamily="34" charset="0"/>
+              <a:buChar char="•"/>
+              <a:defRPr sz="2400" kern="1200">
+                <a:solidFill>
+                  <a:schemeClr val="tx1"/>
+                </a:solidFill>
+                <a:latin typeface="+mn-lt"/>
+                <a:ea typeface="+mn-ea"/>
+                <a:cs typeface="+mn-cs"/>
+              </a:defRPr>
+            </a:lvl3pPr>
+            <a:lvl4pPr marL="1600200" indent="-228600" algn="l" defTabSz="914400" rtl="0" eaLnBrk="1" latinLnBrk="0" hangingPunct="1">
+              <a:spcBef>
+                <a:spcPct val="20000"/>
+              </a:spcBef>
+              <a:buFont typeface="Arial" panose="020B0604020202020204" pitchFamily="34" charset="0"/>
+              <a:buChar char="–"/>
+              <a:defRPr sz="2000" kern="1200">
+                <a:solidFill>
+                  <a:schemeClr val="tx1"/>
+                </a:solidFill>
+                <a:latin typeface="+mn-lt"/>
+                <a:ea typeface="+mn-ea"/>
+                <a:cs typeface="+mn-cs"/>
+              </a:defRPr>
+            </a:lvl4pPr>
+            <a:lvl5pPr marL="2057400" indent="-228600" algn="l" defTabSz="914400" rtl="0" eaLnBrk="1" latinLnBrk="0" hangingPunct="1">
+              <a:spcBef>
+                <a:spcPct val="20000"/>
+              </a:spcBef>
+              <a:buFont typeface="Arial" panose="020B0604020202020204" pitchFamily="34" charset="0"/>
+              <a:buChar char="»"/>
+              <a:defRPr sz="2000" kern="1200">
+                <a:solidFill>
+                  <a:schemeClr val="tx1"/>
+                </a:solidFill>
+                <a:latin typeface="+mn-lt"/>
+                <a:ea typeface="+mn-ea"/>
+                <a:cs typeface="+mn-cs"/>
+              </a:defRPr>
+            </a:lvl5pPr>
+            <a:lvl6pPr marL="2514600" indent="-228600" algn="l" defTabSz="914400" rtl="0" eaLnBrk="1" latinLnBrk="0" hangingPunct="1">
+              <a:spcBef>
+                <a:spcPct val="20000"/>
+              </a:spcBef>
+              <a:buFont typeface="Arial" panose="020B0604020202020204" pitchFamily="34" charset="0"/>
+              <a:buChar char="•"/>
+              <a:defRPr sz="2000" kern="1200">
+                <a:solidFill>
+                  <a:schemeClr val="tx1"/>
+                </a:solidFill>
+                <a:latin typeface="+mn-lt"/>
+                <a:ea typeface="+mn-ea"/>
+                <a:cs typeface="+mn-cs"/>
+              </a:defRPr>
+            </a:lvl6pPr>
+            <a:lvl7pPr marL="2971800" indent="-228600" algn="l" defTabSz="914400" rtl="0" eaLnBrk="1" latinLnBrk="0" hangingPunct="1">
+              <a:spcBef>
+                <a:spcPct val="20000"/>
+              </a:spcBef>
+              <a:buFont typeface="Arial" panose="020B0604020202020204" pitchFamily="34" charset="0"/>
+              <a:buChar char="•"/>
+              <a:defRPr sz="2000" kern="1200">
+                <a:solidFill>
+                  <a:schemeClr val="tx1"/>
+                </a:solidFill>
+                <a:latin typeface="+mn-lt"/>
+                <a:ea typeface="+mn-ea"/>
+                <a:cs typeface="+mn-cs"/>
+              </a:defRPr>
+            </a:lvl7pPr>
+            <a:lvl8pPr marL="3429000" indent="-228600" algn="l" defTabSz="914400" rtl="0" eaLnBrk="1" latinLnBrk="0" hangingPunct="1">
+              <a:spcBef>
+                <a:spcPct val="20000"/>
+              </a:spcBef>
+              <a:buFont typeface="Arial" panose="020B0604020202020204" pitchFamily="34" charset="0"/>
+              <a:buChar char="•"/>
+              <a:defRPr sz="2000" kern="1200">
+                <a:solidFill>
+                  <a:schemeClr val="tx1"/>
+                </a:solidFill>
+                <a:latin typeface="+mn-lt"/>
+                <a:ea typeface="+mn-ea"/>
+                <a:cs typeface="+mn-cs"/>
+              </a:defRPr>
+            </a:lvl8pPr>
+            <a:lvl9pPr marL="3886200" indent="-228600" algn="l" defTabSz="914400" rtl="0" eaLnBrk="1" latinLnBrk="0" hangingPunct="1">
+              <a:spcBef>
+                <a:spcPct val="20000"/>
+              </a:spcBef>
+              <a:buFont typeface="Arial" panose="020B0604020202020204" pitchFamily="34" charset="0"/>
+              <a:buChar char="•"/>
+              <a:defRPr sz="2000" kern="1200">
+                <a:solidFill>
+                  <a:schemeClr val="tx1"/>
+                </a:solidFill>
+                <a:latin typeface="+mn-lt"/>
+                <a:ea typeface="+mn-ea"/>
+                <a:cs typeface="+mn-cs"/>
+              </a:defRPr>
+            </a:lvl9pPr>
+          </a:lstStyle>
+          <a:p>
+            <a:r>
+              <a:rPr lang="en-US" sz="1600" dirty="0"/>
+              <a:t>Slide 6 -  Figure 2.2 - mrp-observation.jpg</a:t>
+            </a:r>
+          </a:p>
+          <a:p>
+            <a:pPr lvl="1"/>
+            <a:r>
+              <a:rPr lang="en-US" sz="1200" dirty="0"/>
+              <a:t>Copy of slide 3, then updated to reposition some of the boxes/lines/text, added additional lines for </a:t>
+            </a:r>
+            <a:r>
+              <a:rPr lang="en-US" sz="1200" dirty="0" err="1"/>
+              <a:t>evaluatedResource</a:t>
+            </a:r>
+            <a:r>
+              <a:rPr lang="en-US" sz="1200" dirty="0"/>
+              <a:t>, changed couple of the lines’ weight to be consistent with the rest</a:t>
+            </a:r>
+          </a:p>
+          <a:p>
+            <a:endParaRPr lang="en-US" sz="1600" dirty="0"/>
+          </a:p>
+          <a:p>
+            <a:endParaRPr lang="en-US" dirty="0"/>
+          </a:p>
+        </p:txBody>
+      </p:sp>
+    </p:spTree>
+    <p:extLst>
+      <p:ext uri="{BB962C8B-B14F-4D97-AF65-F5344CB8AC3E}">
+        <p14:creationId xmlns:p14="http://schemas.microsoft.com/office/powerpoint/2010/main" val="4161874021"/>
       </p:ext>
     </p:extLst>
   </p:cSld>

</xml_diff>